<commit_message>
ppt updated and homepage design slightly modified
</commit_message>
<xml_diff>
--- a/Presentation Slides/1285464_Academic_Journal_Publication_System.pptx
+++ b/Presentation Slides/1285464_Academic_Journal_Publication_System.pptx
@@ -4,6 +4,9 @@
   <p:sldMasterIdLst>
     <p:sldMasterId id="2147483648" r:id="rId1"/>
   </p:sldMasterIdLst>
+  <p:notesMasterIdLst>
+    <p:notesMasterId r:id="rId9"/>
+  </p:notesMasterIdLst>
   <p:sldIdLst>
     <p:sldId id="256" r:id="rId2"/>
     <p:sldId id="257" r:id="rId3"/>
@@ -11,6 +14,7 @@
     <p:sldId id="260" r:id="rId5"/>
     <p:sldId id="261" r:id="rId6"/>
     <p:sldId id="262" r:id="rId7"/>
+    <p:sldId id="263" r:id="rId8"/>
   </p:sldIdLst>
   <p:sldSz cx="12192000" cy="6858000"/>
   <p:notesSz cx="6858000" cy="9144000"/>
@@ -109,7 +113,361 @@
       </a:defRPr>
     </a:lvl9pPr>
   </p:defaultTextStyle>
+  <p:extLst>
+    <p:ext uri="{EFAFB233-063F-42B5-8137-9DF3F51BA10A}">
+      <p15:sldGuideLst xmlns:p15="http://schemas.microsoft.com/office/powerpoint/2012/main"/>
+    </p:ext>
+  </p:extLst>
 </p:presentation>
+</file>
+
+<file path=ppt/notesMasters/notesMaster1.xml><?xml version="1.0" encoding="utf-8"?>
+<p:notesMaster xmlns:a="http://schemas.openxmlformats.org/drawingml/2006/main" xmlns:r="http://schemas.openxmlformats.org/officeDocument/2006/relationships" xmlns:p="http://schemas.openxmlformats.org/presentationml/2006/main">
+  <p:cSld>
+    <p:bg>
+      <p:bgRef idx="1001">
+        <a:schemeClr val="bg1"/>
+      </p:bgRef>
+    </p:bg>
+    <p:spTree>
+      <p:nvGrpSpPr>
+        <p:cNvPr id="1" name=""/>
+        <p:cNvGrpSpPr/>
+        <p:nvPr/>
+      </p:nvGrpSpPr>
+      <p:grpSpPr>
+        <a:xfrm>
+          <a:off x="0" y="0"/>
+          <a:ext cx="0" cy="0"/>
+          <a:chOff x="0" y="0"/>
+          <a:chExt cx="0" cy="0"/>
+        </a:xfrm>
+      </p:grpSpPr>
+      <p:sp>
+        <p:nvSpPr>
+          <p:cNvPr id="2" name="Header Placeholder 1"/>
+          <p:cNvSpPr>
+            <a:spLocks noGrp="1"/>
+          </p:cNvSpPr>
+          <p:nvPr>
+            <p:ph type="hdr" sz="quarter"/>
+          </p:nvPr>
+        </p:nvSpPr>
+        <p:spPr>
+          <a:xfrm>
+            <a:off x="0" y="0"/>
+            <a:ext cx="2971800" cy="458788"/>
+          </a:xfrm>
+          <a:prstGeom prst="rect">
+            <a:avLst/>
+          </a:prstGeom>
+        </p:spPr>
+        <p:txBody>
+          <a:bodyPr vert="horz" lIns="91440" tIns="45720" rIns="91440" bIns="45720" rtlCol="0"/>
+          <a:lstStyle>
+            <a:lvl1pPr algn="l">
+              <a:defRPr sz="1200"/>
+            </a:lvl1pPr>
+          </a:lstStyle>
+          <a:p>
+            <a:endParaRPr lang="en-US"/>
+          </a:p>
+        </p:txBody>
+      </p:sp>
+      <p:sp>
+        <p:nvSpPr>
+          <p:cNvPr id="3" name="Date Placeholder 2"/>
+          <p:cNvSpPr>
+            <a:spLocks noGrp="1"/>
+          </p:cNvSpPr>
+          <p:nvPr>
+            <p:ph type="dt" idx="1"/>
+          </p:nvPr>
+        </p:nvSpPr>
+        <p:spPr>
+          <a:xfrm>
+            <a:off x="3884613" y="0"/>
+            <a:ext cx="2971800" cy="458788"/>
+          </a:xfrm>
+          <a:prstGeom prst="rect">
+            <a:avLst/>
+          </a:prstGeom>
+        </p:spPr>
+        <p:txBody>
+          <a:bodyPr vert="horz" lIns="91440" tIns="45720" rIns="91440" bIns="45720" rtlCol="0"/>
+          <a:lstStyle>
+            <a:lvl1pPr algn="r">
+              <a:defRPr sz="1200"/>
+            </a:lvl1pPr>
+          </a:lstStyle>
+          <a:p>
+            <a:fld id="{A955D288-C927-46B7-9308-41C8F4860209}" type="datetimeFigureOut">
+              <a:rPr lang="en-US" smtClean="0"/>
+              <a:t>4/21/2025</a:t>
+            </a:fld>
+            <a:endParaRPr lang="en-US"/>
+          </a:p>
+        </p:txBody>
+      </p:sp>
+      <p:sp>
+        <p:nvSpPr>
+          <p:cNvPr id="4" name="Slide Image Placeholder 3"/>
+          <p:cNvSpPr>
+            <a:spLocks noGrp="1" noRot="1" noChangeAspect="1"/>
+          </p:cNvSpPr>
+          <p:nvPr>
+            <p:ph type="sldImg" idx="2"/>
+          </p:nvPr>
+        </p:nvSpPr>
+        <p:spPr>
+          <a:xfrm>
+            <a:off x="685800" y="1143000"/>
+            <a:ext cx="5486400" cy="3086100"/>
+          </a:xfrm>
+          <a:prstGeom prst="rect">
+            <a:avLst/>
+          </a:prstGeom>
+          <a:noFill/>
+          <a:ln w="12700">
+            <a:solidFill>
+              <a:prstClr val="black"/>
+            </a:solidFill>
+          </a:ln>
+        </p:spPr>
+        <p:txBody>
+          <a:bodyPr vert="horz" lIns="91440" tIns="45720" rIns="91440" bIns="45720" rtlCol="0" anchor="ctr"/>
+          <a:lstStyle/>
+          <a:p>
+            <a:endParaRPr lang="en-US"/>
+          </a:p>
+        </p:txBody>
+      </p:sp>
+      <p:sp>
+        <p:nvSpPr>
+          <p:cNvPr id="5" name="Notes Placeholder 4"/>
+          <p:cNvSpPr>
+            <a:spLocks noGrp="1"/>
+          </p:cNvSpPr>
+          <p:nvPr>
+            <p:ph type="body" sz="quarter" idx="3"/>
+          </p:nvPr>
+        </p:nvSpPr>
+        <p:spPr>
+          <a:xfrm>
+            <a:off x="685800" y="4400550"/>
+            <a:ext cx="5486400" cy="3600450"/>
+          </a:xfrm>
+          <a:prstGeom prst="rect">
+            <a:avLst/>
+          </a:prstGeom>
+        </p:spPr>
+        <p:txBody>
+          <a:bodyPr vert="horz" lIns="91440" tIns="45720" rIns="91440" bIns="45720" rtlCol="0"/>
+          <a:lstStyle/>
+          <a:p>
+            <a:pPr lvl="0"/>
+            <a:r>
+              <a:rPr lang="en-US"/>
+              <a:t>Click to edit Master text styles</a:t>
+            </a:r>
+          </a:p>
+          <a:p>
+            <a:pPr lvl="1"/>
+            <a:r>
+              <a:rPr lang="en-US"/>
+              <a:t>Second level</a:t>
+            </a:r>
+          </a:p>
+          <a:p>
+            <a:pPr lvl="2"/>
+            <a:r>
+              <a:rPr lang="en-US"/>
+              <a:t>Third level</a:t>
+            </a:r>
+          </a:p>
+          <a:p>
+            <a:pPr lvl="3"/>
+            <a:r>
+              <a:rPr lang="en-US"/>
+              <a:t>Fourth level</a:t>
+            </a:r>
+          </a:p>
+          <a:p>
+            <a:pPr lvl="4"/>
+            <a:r>
+              <a:rPr lang="en-US"/>
+              <a:t>Fifth level</a:t>
+            </a:r>
+          </a:p>
+        </p:txBody>
+      </p:sp>
+      <p:sp>
+        <p:nvSpPr>
+          <p:cNvPr id="6" name="Footer Placeholder 5"/>
+          <p:cNvSpPr>
+            <a:spLocks noGrp="1"/>
+          </p:cNvSpPr>
+          <p:nvPr>
+            <p:ph type="ftr" sz="quarter" idx="4"/>
+          </p:nvPr>
+        </p:nvSpPr>
+        <p:spPr>
+          <a:xfrm>
+            <a:off x="0" y="8685213"/>
+            <a:ext cx="2971800" cy="458787"/>
+          </a:xfrm>
+          <a:prstGeom prst="rect">
+            <a:avLst/>
+          </a:prstGeom>
+        </p:spPr>
+        <p:txBody>
+          <a:bodyPr vert="horz" lIns="91440" tIns="45720" rIns="91440" bIns="45720" rtlCol="0" anchor="b"/>
+          <a:lstStyle>
+            <a:lvl1pPr algn="l">
+              <a:defRPr sz="1200"/>
+            </a:lvl1pPr>
+          </a:lstStyle>
+          <a:p>
+            <a:endParaRPr lang="en-US"/>
+          </a:p>
+        </p:txBody>
+      </p:sp>
+      <p:sp>
+        <p:nvSpPr>
+          <p:cNvPr id="7" name="Slide Number Placeholder 6"/>
+          <p:cNvSpPr>
+            <a:spLocks noGrp="1"/>
+          </p:cNvSpPr>
+          <p:nvPr>
+            <p:ph type="sldNum" sz="quarter" idx="5"/>
+          </p:nvPr>
+        </p:nvSpPr>
+        <p:spPr>
+          <a:xfrm>
+            <a:off x="3884613" y="8685213"/>
+            <a:ext cx="2971800" cy="458787"/>
+          </a:xfrm>
+          <a:prstGeom prst="rect">
+            <a:avLst/>
+          </a:prstGeom>
+        </p:spPr>
+        <p:txBody>
+          <a:bodyPr vert="horz" lIns="91440" tIns="45720" rIns="91440" bIns="45720" rtlCol="0" anchor="b"/>
+          <a:lstStyle>
+            <a:lvl1pPr algn="r">
+              <a:defRPr sz="1200"/>
+            </a:lvl1pPr>
+          </a:lstStyle>
+          <a:p>
+            <a:fld id="{FA83B1F7-3679-47C1-A1C0-448BB37F83D2}" type="slidenum">
+              <a:rPr lang="en-US" smtClean="0"/>
+              <a:t>‹#›</a:t>
+            </a:fld>
+            <a:endParaRPr lang="en-US"/>
+          </a:p>
+        </p:txBody>
+      </p:sp>
+    </p:spTree>
+    <p:extLst>
+      <p:ext uri="{BB962C8B-B14F-4D97-AF65-F5344CB8AC3E}">
+        <p14:creationId xmlns:p14="http://schemas.microsoft.com/office/powerpoint/2010/main" val="3660628556"/>
+      </p:ext>
+    </p:extLst>
+  </p:cSld>
+  <p:clrMap bg1="lt1" tx1="dk1" bg2="lt2" tx2="dk2" accent1="accent1" accent2="accent2" accent3="accent3" accent4="accent4" accent5="accent5" accent6="accent6" hlink="hlink" folHlink="folHlink"/>
+  <p:notesStyle>
+    <a:lvl1pPr marL="0" algn="l" defTabSz="914400" rtl="0" eaLnBrk="1" latinLnBrk="0" hangingPunct="1">
+      <a:defRPr sz="1200" kern="1200">
+        <a:solidFill>
+          <a:schemeClr val="tx1"/>
+        </a:solidFill>
+        <a:latin typeface="+mn-lt"/>
+        <a:ea typeface="+mn-ea"/>
+        <a:cs typeface="+mn-cs"/>
+      </a:defRPr>
+    </a:lvl1pPr>
+    <a:lvl2pPr marL="457200" algn="l" defTabSz="914400" rtl="0" eaLnBrk="1" latinLnBrk="0" hangingPunct="1">
+      <a:defRPr sz="1200" kern="1200">
+        <a:solidFill>
+          <a:schemeClr val="tx1"/>
+        </a:solidFill>
+        <a:latin typeface="+mn-lt"/>
+        <a:ea typeface="+mn-ea"/>
+        <a:cs typeface="+mn-cs"/>
+      </a:defRPr>
+    </a:lvl2pPr>
+    <a:lvl3pPr marL="914400" algn="l" defTabSz="914400" rtl="0" eaLnBrk="1" latinLnBrk="0" hangingPunct="1">
+      <a:defRPr sz="1200" kern="1200">
+        <a:solidFill>
+          <a:schemeClr val="tx1"/>
+        </a:solidFill>
+        <a:latin typeface="+mn-lt"/>
+        <a:ea typeface="+mn-ea"/>
+        <a:cs typeface="+mn-cs"/>
+      </a:defRPr>
+    </a:lvl3pPr>
+    <a:lvl4pPr marL="1371600" algn="l" defTabSz="914400" rtl="0" eaLnBrk="1" latinLnBrk="0" hangingPunct="1">
+      <a:defRPr sz="1200" kern="1200">
+        <a:solidFill>
+          <a:schemeClr val="tx1"/>
+        </a:solidFill>
+        <a:latin typeface="+mn-lt"/>
+        <a:ea typeface="+mn-ea"/>
+        <a:cs typeface="+mn-cs"/>
+      </a:defRPr>
+    </a:lvl4pPr>
+    <a:lvl5pPr marL="1828800" algn="l" defTabSz="914400" rtl="0" eaLnBrk="1" latinLnBrk="0" hangingPunct="1">
+      <a:defRPr sz="1200" kern="1200">
+        <a:solidFill>
+          <a:schemeClr val="tx1"/>
+        </a:solidFill>
+        <a:latin typeface="+mn-lt"/>
+        <a:ea typeface="+mn-ea"/>
+        <a:cs typeface="+mn-cs"/>
+      </a:defRPr>
+    </a:lvl5pPr>
+    <a:lvl6pPr marL="2286000" algn="l" defTabSz="914400" rtl="0" eaLnBrk="1" latinLnBrk="0" hangingPunct="1">
+      <a:defRPr sz="1200" kern="1200">
+        <a:solidFill>
+          <a:schemeClr val="tx1"/>
+        </a:solidFill>
+        <a:latin typeface="+mn-lt"/>
+        <a:ea typeface="+mn-ea"/>
+        <a:cs typeface="+mn-cs"/>
+      </a:defRPr>
+    </a:lvl6pPr>
+    <a:lvl7pPr marL="2743200" algn="l" defTabSz="914400" rtl="0" eaLnBrk="1" latinLnBrk="0" hangingPunct="1">
+      <a:defRPr sz="1200" kern="1200">
+        <a:solidFill>
+          <a:schemeClr val="tx1"/>
+        </a:solidFill>
+        <a:latin typeface="+mn-lt"/>
+        <a:ea typeface="+mn-ea"/>
+        <a:cs typeface="+mn-cs"/>
+      </a:defRPr>
+    </a:lvl7pPr>
+    <a:lvl8pPr marL="3200400" algn="l" defTabSz="914400" rtl="0" eaLnBrk="1" latinLnBrk="0" hangingPunct="1">
+      <a:defRPr sz="1200" kern="1200">
+        <a:solidFill>
+          <a:schemeClr val="tx1"/>
+        </a:solidFill>
+        <a:latin typeface="+mn-lt"/>
+        <a:ea typeface="+mn-ea"/>
+        <a:cs typeface="+mn-cs"/>
+      </a:defRPr>
+    </a:lvl8pPr>
+    <a:lvl9pPr marL="3657600" algn="l" defTabSz="914400" rtl="0" eaLnBrk="1" latinLnBrk="0" hangingPunct="1">
+      <a:defRPr sz="1200" kern="1200">
+        <a:solidFill>
+          <a:schemeClr val="tx1"/>
+        </a:solidFill>
+        <a:latin typeface="+mn-lt"/>
+        <a:ea typeface="+mn-ea"/>
+        <a:cs typeface="+mn-cs"/>
+      </a:defRPr>
+    </a:lvl9pPr>
+  </p:notesStyle>
+</p:notesMaster>
 </file>
 
 <file path=ppt/slideLayouts/slideLayout1.xml><?xml version="1.0" encoding="utf-8"?>
@@ -257,9 +615,9 @@
           <a:bodyPr/>
           <a:lstStyle/>
           <a:p>
-            <a:fld id="{E058C91A-1484-4A5A-BABA-624F86BDAE04}" type="datetimeFigureOut">
+            <a:fld id="{1FC4FCBB-52D8-4FAC-9E27-B78CD33CF45B}" type="datetime1">
               <a:rPr lang="en-US" smtClean="0"/>
-              <a:t>4/20/2025</a:t>
+              <a:t>4/21/2025</a:t>
             </a:fld>
             <a:endParaRPr lang="en-US"/>
           </a:p>
@@ -455,9 +813,9 @@
           <a:bodyPr/>
           <a:lstStyle/>
           <a:p>
-            <a:fld id="{E058C91A-1484-4A5A-BABA-624F86BDAE04}" type="datetimeFigureOut">
+            <a:fld id="{C21F15B8-BE3A-491C-BA12-45A42ACF9921}" type="datetime1">
               <a:rPr lang="en-US" smtClean="0"/>
-              <a:t>4/20/2025</a:t>
+              <a:t>4/21/2025</a:t>
             </a:fld>
             <a:endParaRPr lang="en-US"/>
           </a:p>
@@ -663,9 +1021,9 @@
           <a:bodyPr/>
           <a:lstStyle/>
           <a:p>
-            <a:fld id="{E058C91A-1484-4A5A-BABA-624F86BDAE04}" type="datetimeFigureOut">
+            <a:fld id="{A924A0E7-EB2B-4575-9AED-238A1370FC9A}" type="datetime1">
               <a:rPr lang="en-US" smtClean="0"/>
-              <a:t>4/20/2025</a:t>
+              <a:t>4/21/2025</a:t>
             </a:fld>
             <a:endParaRPr lang="en-US"/>
           </a:p>
@@ -861,9 +1219,9 @@
           <a:bodyPr/>
           <a:lstStyle/>
           <a:p>
-            <a:fld id="{E058C91A-1484-4A5A-BABA-624F86BDAE04}" type="datetimeFigureOut">
+            <a:fld id="{011A56B0-369A-4B1B-8AC9-69BA24BFD810}" type="datetime1">
               <a:rPr lang="en-US" smtClean="0"/>
-              <a:t>4/20/2025</a:t>
+              <a:t>4/21/2025</a:t>
             </a:fld>
             <a:endParaRPr lang="en-US"/>
           </a:p>
@@ -1136,9 +1494,9 @@
           <a:bodyPr/>
           <a:lstStyle/>
           <a:p>
-            <a:fld id="{E058C91A-1484-4A5A-BABA-624F86BDAE04}" type="datetimeFigureOut">
+            <a:fld id="{75829453-29C1-4779-84EC-B4B7ED2D38D5}" type="datetime1">
               <a:rPr lang="en-US" smtClean="0"/>
-              <a:t>4/20/2025</a:t>
+              <a:t>4/21/2025</a:t>
             </a:fld>
             <a:endParaRPr lang="en-US"/>
           </a:p>
@@ -1401,9 +1759,9 @@
           <a:bodyPr/>
           <a:lstStyle/>
           <a:p>
-            <a:fld id="{E058C91A-1484-4A5A-BABA-624F86BDAE04}" type="datetimeFigureOut">
+            <a:fld id="{2594CB17-E1F8-4D86-9997-C69430279E7F}" type="datetime1">
               <a:rPr lang="en-US" smtClean="0"/>
-              <a:t>4/20/2025</a:t>
+              <a:t>4/21/2025</a:t>
             </a:fld>
             <a:endParaRPr lang="en-US"/>
           </a:p>
@@ -1813,9 +2171,9 @@
           <a:bodyPr/>
           <a:lstStyle/>
           <a:p>
-            <a:fld id="{E058C91A-1484-4A5A-BABA-624F86BDAE04}" type="datetimeFigureOut">
+            <a:fld id="{CC309BA0-001F-47EF-93BF-742DDC8E8FC0}" type="datetime1">
               <a:rPr lang="en-US" smtClean="0"/>
-              <a:t>4/20/2025</a:t>
+              <a:t>4/21/2025</a:t>
             </a:fld>
             <a:endParaRPr lang="en-US"/>
           </a:p>
@@ -1954,9 +2312,9 @@
           <a:bodyPr/>
           <a:lstStyle/>
           <a:p>
-            <a:fld id="{E058C91A-1484-4A5A-BABA-624F86BDAE04}" type="datetimeFigureOut">
+            <a:fld id="{141B043F-B343-4CA5-B060-9E2B2BC07A78}" type="datetime1">
               <a:rPr lang="en-US" smtClean="0"/>
-              <a:t>4/20/2025</a:t>
+              <a:t>4/21/2025</a:t>
             </a:fld>
             <a:endParaRPr lang="en-US"/>
           </a:p>
@@ -2067,9 +2425,9 @@
           <a:bodyPr/>
           <a:lstStyle/>
           <a:p>
-            <a:fld id="{E058C91A-1484-4A5A-BABA-624F86BDAE04}" type="datetimeFigureOut">
+            <a:fld id="{E913A3A9-4579-49DB-8DD1-4278D0207210}" type="datetime1">
               <a:rPr lang="en-US" smtClean="0"/>
-              <a:t>4/20/2025</a:t>
+              <a:t>4/21/2025</a:t>
             </a:fld>
             <a:endParaRPr lang="en-US"/>
           </a:p>
@@ -2378,9 +2736,9 @@
           <a:bodyPr/>
           <a:lstStyle/>
           <a:p>
-            <a:fld id="{E058C91A-1484-4A5A-BABA-624F86BDAE04}" type="datetimeFigureOut">
+            <a:fld id="{1516D631-B8A4-4245-9193-6D0C30E0CD0C}" type="datetime1">
               <a:rPr lang="en-US" smtClean="0"/>
-              <a:t>4/20/2025</a:t>
+              <a:t>4/21/2025</a:t>
             </a:fld>
             <a:endParaRPr lang="en-US"/>
           </a:p>
@@ -2666,9 +3024,9 @@
           <a:bodyPr/>
           <a:lstStyle/>
           <a:p>
-            <a:fld id="{E058C91A-1484-4A5A-BABA-624F86BDAE04}" type="datetimeFigureOut">
+            <a:fld id="{EFFAC2AA-EE1F-4554-9E21-F38ECC570A7F}" type="datetime1">
               <a:rPr lang="en-US" smtClean="0"/>
-              <a:t>4/20/2025</a:t>
+              <a:t>4/21/2025</a:t>
             </a:fld>
             <a:endParaRPr lang="en-US"/>
           </a:p>
@@ -2917,9 +3275,9 @@
             </a:lvl1pPr>
           </a:lstStyle>
           <a:p>
-            <a:fld id="{E058C91A-1484-4A5A-BABA-624F86BDAE04}" type="datetimeFigureOut">
+            <a:fld id="{48225813-D9DC-405D-9A21-745A3C8E8C9E}" type="datetime1">
               <a:rPr lang="en-US" smtClean="0"/>
-              <a:t>4/20/2025</a:t>
+              <a:t>4/21/2025</a:t>
             </a:fld>
             <a:endParaRPr lang="en-US"/>
           </a:p>
@@ -3036,6 +3394,7 @@
     <p:sldLayoutId id="2147483658" r:id="rId10"/>
     <p:sldLayoutId id="2147483659" r:id="rId11"/>
   </p:sldLayoutIdLst>
+  <p:hf hdr="0" ftr="0" dt="0"/>
   <p:txStyles>
     <p:titleStyle>
       <a:lvl1pPr algn="l" defTabSz="914400" rtl="0" eaLnBrk="1" latinLnBrk="0" hangingPunct="1">
@@ -3593,6 +3952,35 @@
           </a:p>
         </p:txBody>
       </p:sp>
+      <p:sp>
+        <p:nvSpPr>
+          <p:cNvPr id="2" name="Slide Number Placeholder 1">
+            <a:extLst>
+              <a:ext uri="{FF2B5EF4-FFF2-40B4-BE49-F238E27FC236}">
+                <a16:creationId xmlns:a16="http://schemas.microsoft.com/office/drawing/2014/main" id="{7F0334F1-91AE-4C5C-A02C-2D01125011D2}"/>
+              </a:ext>
+            </a:extLst>
+          </p:cNvPr>
+          <p:cNvSpPr>
+            <a:spLocks noGrp="1"/>
+          </p:cNvSpPr>
+          <p:nvPr>
+            <p:ph type="sldNum" sz="quarter" idx="12"/>
+          </p:nvPr>
+        </p:nvSpPr>
+        <p:spPr/>
+        <p:txBody>
+          <a:bodyPr/>
+          <a:lstStyle/>
+          <a:p>
+            <a:fld id="{0F70F428-429A-4369-BFBB-0FC7FC84F61D}" type="slidenum">
+              <a:rPr lang="en-US" smtClean="0"/>
+              <a:t>1</a:t>
+            </a:fld>
+            <a:endParaRPr lang="en-US"/>
+          </a:p>
+        </p:txBody>
+      </p:sp>
     </p:spTree>
     <p:extLst>
       <p:ext uri="{BB962C8B-B14F-4D97-AF65-F5344CB8AC3E}">
@@ -3638,7 +4026,7 @@
         <p:spPr>
           <a:xfrm>
             <a:off x="806239" y="444849"/>
-            <a:ext cx="5874780" cy="707886"/>
+            <a:ext cx="5874780" cy="646331"/>
           </a:xfrm>
           <a:prstGeom prst="rect">
             <a:avLst/>
@@ -3656,7 +4044,7 @@
               <a:buChar char="v"/>
             </a:pPr>
             <a:r>
-              <a:rPr lang="en-US" sz="4000" dirty="0">
+              <a:rPr lang="en-US" sz="3600" dirty="0">
                 <a:solidFill>
                   <a:schemeClr val="tx2"/>
                 </a:solidFill>
@@ -3824,7 +4212,7 @@
             </a:r>
           </a:p>
           <a:p>
-            <a:pPr marL="800100" lvl="1" indent="-342900">
+            <a:pPr marL="342900" indent="-342900">
               <a:buFont typeface="Wingdings" panose="05000000000000000000" pitchFamily="2" charset="2"/>
               <a:buChar char="q"/>
             </a:pPr>
@@ -3838,7 +4226,7 @@
             </a:r>
           </a:p>
           <a:p>
-            <a:pPr marL="800100" lvl="1" indent="-342900">
+            <a:pPr marL="342900" indent="-342900">
               <a:buFont typeface="Wingdings" panose="05000000000000000000" pitchFamily="2" charset="2"/>
               <a:buChar char="q"/>
             </a:pPr>
@@ -3852,7 +4240,7 @@
             </a:r>
           </a:p>
           <a:p>
-            <a:pPr marL="800100" lvl="1" indent="-342900">
+            <a:pPr marL="342900" indent="-342900">
               <a:buFont typeface="Wingdings" panose="05000000000000000000" pitchFamily="2" charset="2"/>
               <a:buChar char="q"/>
             </a:pPr>
@@ -3866,7 +4254,7 @@
             </a:r>
           </a:p>
           <a:p>
-            <a:pPr marL="800100" lvl="1" indent="-342900">
+            <a:pPr marL="342900" indent="-342900">
               <a:buFont typeface="Wingdings" panose="05000000000000000000" pitchFamily="2" charset="2"/>
               <a:buChar char="q"/>
             </a:pPr>
@@ -3880,7 +4268,7 @@
             </a:r>
           </a:p>
           <a:p>
-            <a:pPr marL="800100" lvl="1" indent="-342900">
+            <a:pPr marL="342900" indent="-342900">
               <a:buFont typeface="Wingdings" panose="05000000000000000000" pitchFamily="2" charset="2"/>
               <a:buChar char="q"/>
             </a:pPr>
@@ -3946,7 +4334,7 @@
             </a:r>
           </a:p>
           <a:p>
-            <a:pPr marL="800100" lvl="1" indent="-342900">
+            <a:pPr marL="342900" indent="-342900">
               <a:buFont typeface="Wingdings" panose="05000000000000000000" pitchFamily="2" charset="2"/>
               <a:buChar char="q"/>
             </a:pPr>
@@ -3960,7 +4348,7 @@
             </a:r>
           </a:p>
           <a:p>
-            <a:pPr marL="800100" lvl="1" indent="-342900">
+            <a:pPr marL="342900" indent="-342900">
               <a:buFont typeface="Wingdings" panose="05000000000000000000" pitchFamily="2" charset="2"/>
               <a:buChar char="q"/>
             </a:pPr>
@@ -3974,7 +4362,7 @@
             </a:r>
           </a:p>
           <a:p>
-            <a:pPr marL="800100" lvl="1" indent="-342900">
+            <a:pPr marL="342900" indent="-342900">
               <a:buFont typeface="Wingdings" panose="05000000000000000000" pitchFamily="2" charset="2"/>
               <a:buChar char="q"/>
             </a:pPr>
@@ -3988,7 +4376,7 @@
             </a:r>
           </a:p>
           <a:p>
-            <a:pPr marL="800100" lvl="1" indent="-342900">
+            <a:pPr marL="342900" indent="-342900">
               <a:buFont typeface="Wingdings" panose="05000000000000000000" pitchFamily="2" charset="2"/>
               <a:buChar char="q"/>
             </a:pPr>
@@ -4002,7 +4390,7 @@
             </a:r>
           </a:p>
           <a:p>
-            <a:pPr marL="800100" lvl="1" indent="-342900">
+            <a:pPr marL="342900" indent="-342900">
               <a:buFont typeface="Wingdings" panose="05000000000000000000" pitchFamily="2" charset="2"/>
               <a:buChar char="q"/>
             </a:pPr>
@@ -4250,6 +4638,35 @@
               </a:rPr>
               <a:t>4</a:t>
             </a:r>
+          </a:p>
+        </p:txBody>
+      </p:sp>
+      <p:sp>
+        <p:nvSpPr>
+          <p:cNvPr id="8" name="Slide Number Placeholder 7">
+            <a:extLst>
+              <a:ext uri="{FF2B5EF4-FFF2-40B4-BE49-F238E27FC236}">
+                <a16:creationId xmlns:a16="http://schemas.microsoft.com/office/drawing/2014/main" id="{31A842EA-42DF-4069-ABC5-CAED98DCD682}"/>
+              </a:ext>
+            </a:extLst>
+          </p:cNvPr>
+          <p:cNvSpPr>
+            <a:spLocks noGrp="1"/>
+          </p:cNvSpPr>
+          <p:nvPr>
+            <p:ph type="sldNum" sz="quarter" idx="12"/>
+          </p:nvPr>
+        </p:nvSpPr>
+        <p:spPr/>
+        <p:txBody>
+          <a:bodyPr/>
+          <a:lstStyle/>
+          <a:p>
+            <a:fld id="{0F70F428-429A-4369-BFBB-0FC7FC84F61D}" type="slidenum">
+              <a:rPr lang="en-US" smtClean="0"/>
+              <a:t>2</a:t>
+            </a:fld>
+            <a:endParaRPr lang="en-US"/>
           </a:p>
         </p:txBody>
       </p:sp>
@@ -4304,7 +4721,7 @@
         <p:spPr>
           <a:xfrm>
             <a:off x="806239" y="442446"/>
-            <a:ext cx="6169748" cy="707886"/>
+            <a:ext cx="6169748" cy="646331"/>
           </a:xfrm>
           <a:prstGeom prst="rect">
             <a:avLst/>
@@ -4322,7 +4739,7 @@
               <a:buChar char="v"/>
             </a:pPr>
             <a:r>
-              <a:rPr lang="en-US" sz="4000" dirty="0">
+              <a:rPr lang="en-US" sz="3600" dirty="0">
                 <a:solidFill>
                   <a:schemeClr val="tx2"/>
                 </a:solidFill>
@@ -4381,7 +4798,7 @@
             </a:r>
           </a:p>
           <a:p>
-            <a:pPr marL="800100" lvl="1" indent="-342900">
+            <a:pPr marL="342900" indent="-342900">
               <a:lnSpc>
                 <a:spcPct val="150000"/>
               </a:lnSpc>
@@ -4406,7 +4823,7 @@
             </a:r>
           </a:p>
           <a:p>
-            <a:pPr marL="800100" lvl="1" indent="-342900">
+            <a:pPr marL="342900" indent="-342900">
               <a:lnSpc>
                 <a:spcPct val="150000"/>
               </a:lnSpc>
@@ -4431,7 +4848,7 @@
             </a:r>
           </a:p>
           <a:p>
-            <a:pPr marL="800100" lvl="1" indent="-342900">
+            <a:pPr marL="342900" indent="-342900">
               <a:lnSpc>
                 <a:spcPct val="150000"/>
               </a:lnSpc>
@@ -4503,7 +4920,7 @@
             </a:r>
           </a:p>
           <a:p>
-            <a:pPr marL="800100" lvl="1" indent="-342900">
+            <a:pPr marL="342900" indent="-342900">
               <a:lnSpc>
                 <a:spcPct val="150000"/>
               </a:lnSpc>
@@ -4524,27 +4941,11 @@
                 <a:ea typeface="Nirmala UI" panose="020B0502040204020203" pitchFamily="34" charset="0"/>
                 <a:cs typeface="Nirmala UI" panose="020B0502040204020203" pitchFamily="34" charset="0"/>
               </a:rPr>
-              <a:t>(</a:t>
-            </a:r>
-            <a:r>
-              <a:rPr lang="en-US" sz="2000" i="1" dirty="0" err="1">
-                <a:latin typeface="Nirmala UI" panose="020B0502040204020203" pitchFamily="34" charset="0"/>
-                <a:ea typeface="Nirmala UI" panose="020B0502040204020203" pitchFamily="34" charset="0"/>
-                <a:cs typeface="Nirmala UI" panose="020B0502040204020203" pitchFamily="34" charset="0"/>
-              </a:rPr>
-              <a:t>jdk</a:t>
-            </a:r>
-            <a:r>
-              <a:rPr lang="en-US" sz="2000" i="1" dirty="0">
-                <a:latin typeface="Nirmala UI" panose="020B0502040204020203" pitchFamily="34" charset="0"/>
-                <a:ea typeface="Nirmala UI" panose="020B0502040204020203" pitchFamily="34" charset="0"/>
-                <a:cs typeface="Nirmala UI" panose="020B0502040204020203" pitchFamily="34" charset="0"/>
-              </a:rPr>
-              <a:t> 21)</a:t>
-            </a:r>
-          </a:p>
-          <a:p>
-            <a:pPr marL="800100" lvl="1" indent="-342900">
+              <a:t>(JDK 21)</a:t>
+            </a:r>
+          </a:p>
+          <a:p>
+            <a:pPr marL="342900" indent="-342900">
               <a:lnSpc>
                 <a:spcPct val="150000"/>
               </a:lnSpc>
@@ -4569,7 +4970,7 @@
             </a:r>
           </a:p>
           <a:p>
-            <a:pPr marL="800100" lvl="1" indent="-342900">
+            <a:pPr marL="342900" indent="-342900">
               <a:lnSpc>
                 <a:spcPct val="150000"/>
               </a:lnSpc>
@@ -4586,7 +4987,7 @@
             </a:r>
           </a:p>
           <a:p>
-            <a:pPr marL="800100" lvl="1" indent="-342900">
+            <a:pPr marL="342900" indent="-342900">
               <a:lnSpc>
                 <a:spcPct val="150000"/>
               </a:lnSpc>
@@ -4650,7 +5051,7 @@
             </a:r>
           </a:p>
           <a:p>
-            <a:pPr marL="800100" lvl="1" indent="-342900">
+            <a:pPr marL="342900" indent="-342900">
               <a:lnSpc>
                 <a:spcPct val="150000"/>
               </a:lnSpc>
@@ -4722,7 +5123,7 @@
             </a:r>
           </a:p>
           <a:p>
-            <a:pPr marL="800100" lvl="1" indent="-342900">
+            <a:pPr marL="342900" indent="-342900">
               <a:lnSpc>
                 <a:spcPct val="150000"/>
               </a:lnSpc>
@@ -4747,7 +5148,7 @@
             </a:r>
           </a:p>
           <a:p>
-            <a:pPr marL="800100" lvl="1" indent="-342900">
+            <a:pPr marL="342900" indent="-342900">
               <a:lnSpc>
                 <a:spcPct val="150000"/>
               </a:lnSpc>
@@ -4998,6 +5399,35 @@
               </a:rPr>
               <a:t>4</a:t>
             </a:r>
+          </a:p>
+        </p:txBody>
+      </p:sp>
+      <p:sp>
+        <p:nvSpPr>
+          <p:cNvPr id="11" name="Slide Number Placeholder 10">
+            <a:extLst>
+              <a:ext uri="{FF2B5EF4-FFF2-40B4-BE49-F238E27FC236}">
+                <a16:creationId xmlns:a16="http://schemas.microsoft.com/office/drawing/2014/main" id="{F9EA45E0-8A60-4A02-BE51-2BAD8B6C4851}"/>
+              </a:ext>
+            </a:extLst>
+          </p:cNvPr>
+          <p:cNvSpPr>
+            <a:spLocks noGrp="1"/>
+          </p:cNvSpPr>
+          <p:nvPr>
+            <p:ph type="sldNum" sz="quarter" idx="12"/>
+          </p:nvPr>
+        </p:nvSpPr>
+        <p:spPr/>
+        <p:txBody>
+          <a:bodyPr/>
+          <a:lstStyle/>
+          <a:p>
+            <a:fld id="{0F70F428-429A-4369-BFBB-0FC7FC84F61D}" type="slidenum">
+              <a:rPr lang="en-US" smtClean="0"/>
+              <a:t>3</a:t>
+            </a:fld>
+            <a:endParaRPr lang="en-US"/>
           </a:p>
         </p:txBody>
       </p:sp>
@@ -5052,7 +5482,7 @@
         <p:spPr>
           <a:xfrm>
             <a:off x="806237" y="398204"/>
-            <a:ext cx="8470498" cy="707886"/>
+            <a:ext cx="8470498" cy="646331"/>
           </a:xfrm>
           <a:prstGeom prst="rect">
             <a:avLst/>
@@ -5070,7 +5500,7 @@
               <a:buChar char="v"/>
             </a:pPr>
             <a:r>
-              <a:rPr lang="en-US" sz="4000" dirty="0">
+              <a:rPr lang="en-US" sz="3600" dirty="0">
                 <a:solidFill>
                   <a:schemeClr val="tx2"/>
                 </a:solidFill>
@@ -5296,6 +5726,35 @@
               </a:rPr>
               <a:t>Integrated version control system for multiple submissions.</a:t>
             </a:r>
+          </a:p>
+        </p:txBody>
+      </p:sp>
+      <p:sp>
+        <p:nvSpPr>
+          <p:cNvPr id="5" name="Slide Number Placeholder 4">
+            <a:extLst>
+              <a:ext uri="{FF2B5EF4-FFF2-40B4-BE49-F238E27FC236}">
+                <a16:creationId xmlns:a16="http://schemas.microsoft.com/office/drawing/2014/main" id="{7E54C059-962C-4454-85C9-873FCC4ECF30}"/>
+              </a:ext>
+            </a:extLst>
+          </p:cNvPr>
+          <p:cNvSpPr>
+            <a:spLocks noGrp="1"/>
+          </p:cNvSpPr>
+          <p:nvPr>
+            <p:ph type="sldNum" sz="quarter" idx="12"/>
+          </p:nvPr>
+        </p:nvSpPr>
+        <p:spPr/>
+        <p:txBody>
+          <a:bodyPr/>
+          <a:lstStyle/>
+          <a:p>
+            <a:fld id="{0F70F428-429A-4369-BFBB-0FC7FC84F61D}" type="slidenum">
+              <a:rPr lang="en-US" smtClean="0"/>
+              <a:t>4</a:t>
+            </a:fld>
+            <a:endParaRPr lang="en-US"/>
           </a:p>
         </p:txBody>
       </p:sp>
@@ -5350,7 +5809,7 @@
         <p:spPr>
           <a:xfrm>
             <a:off x="806237" y="398204"/>
-            <a:ext cx="8632731" cy="707886"/>
+            <a:ext cx="8632731" cy="646331"/>
           </a:xfrm>
           <a:prstGeom prst="rect">
             <a:avLst/>
@@ -5368,7 +5827,7 @@
               <a:buChar char="v"/>
             </a:pPr>
             <a:r>
-              <a:rPr lang="en-US" sz="4000" dirty="0">
+              <a:rPr lang="en-US" sz="3600" dirty="0">
                 <a:solidFill>
                   <a:schemeClr val="tx2"/>
                 </a:solidFill>
@@ -5629,6 +6088,35 @@
               </a:rPr>
               <a:t>Analytics (submission rates, acceptance ratios, reviewer activity).</a:t>
             </a:r>
+          </a:p>
+        </p:txBody>
+      </p:sp>
+      <p:sp>
+        <p:nvSpPr>
+          <p:cNvPr id="5" name="Slide Number Placeholder 4">
+            <a:extLst>
+              <a:ext uri="{FF2B5EF4-FFF2-40B4-BE49-F238E27FC236}">
+                <a16:creationId xmlns:a16="http://schemas.microsoft.com/office/drawing/2014/main" id="{46FD7BAF-7314-43C5-8DA3-E7B59183710E}"/>
+              </a:ext>
+            </a:extLst>
+          </p:cNvPr>
+          <p:cNvSpPr>
+            <a:spLocks noGrp="1"/>
+          </p:cNvSpPr>
+          <p:nvPr>
+            <p:ph type="sldNum" sz="quarter" idx="12"/>
+          </p:nvPr>
+        </p:nvSpPr>
+        <p:spPr/>
+        <p:txBody>
+          <a:bodyPr/>
+          <a:lstStyle/>
+          <a:p>
+            <a:fld id="{0F70F428-429A-4369-BFBB-0FC7FC84F61D}" type="slidenum">
+              <a:rPr lang="en-US" smtClean="0"/>
+              <a:t>5</a:t>
+            </a:fld>
+            <a:endParaRPr lang="en-US"/>
           </a:p>
         </p:txBody>
       </p:sp>
@@ -5683,7 +6171,7 @@
         <p:spPr>
           <a:xfrm>
             <a:off x="806238" y="398204"/>
-            <a:ext cx="8278768" cy="707886"/>
+            <a:ext cx="8278768" cy="646331"/>
           </a:xfrm>
           <a:prstGeom prst="rect">
             <a:avLst/>
@@ -5701,7 +6189,7 @@
               <a:buChar char="v"/>
             </a:pPr>
             <a:r>
-              <a:rPr lang="en-US" sz="4000" dirty="0">
+              <a:rPr lang="en-US" sz="3600" dirty="0">
                 <a:solidFill>
                   <a:schemeClr val="tx2"/>
                 </a:solidFill>
@@ -5792,7 +6280,7 @@
                 <a:ea typeface="Nirmala UI" panose="020B0502040204020203" pitchFamily="34" charset="0"/>
                 <a:cs typeface="Nirmala UI" panose="020B0502040204020203" pitchFamily="34" charset="0"/>
               </a:rPr>
-              <a:t>Issue browsing and article viewing (abstract + full text/PDF links)</a:t>
+              <a:t>Issue browsing and article viewing (abstract + full text / PDF links)</a:t>
             </a:r>
           </a:p>
           <a:p>
@@ -5831,10 +6319,387 @@
           </a:p>
         </p:txBody>
       </p:sp>
+      <p:sp>
+        <p:nvSpPr>
+          <p:cNvPr id="4" name="Slide Number Placeholder 3">
+            <a:extLst>
+              <a:ext uri="{FF2B5EF4-FFF2-40B4-BE49-F238E27FC236}">
+                <a16:creationId xmlns:a16="http://schemas.microsoft.com/office/drawing/2014/main" id="{D133A518-796D-401F-A652-462A42FE6EAC}"/>
+              </a:ext>
+            </a:extLst>
+          </p:cNvPr>
+          <p:cNvSpPr>
+            <a:spLocks noGrp="1"/>
+          </p:cNvSpPr>
+          <p:nvPr>
+            <p:ph type="sldNum" sz="quarter" idx="12"/>
+          </p:nvPr>
+        </p:nvSpPr>
+        <p:spPr/>
+        <p:txBody>
+          <a:bodyPr/>
+          <a:lstStyle/>
+          <a:p>
+            <a:fld id="{0F70F428-429A-4369-BFBB-0FC7FC84F61D}" type="slidenum">
+              <a:rPr lang="en-US" smtClean="0"/>
+              <a:t>6</a:t>
+            </a:fld>
+            <a:endParaRPr lang="en-US"/>
+          </a:p>
+        </p:txBody>
+      </p:sp>
     </p:spTree>
     <p:extLst>
       <p:ext uri="{BB962C8B-B14F-4D97-AF65-F5344CB8AC3E}">
         <p14:creationId xmlns:p14="http://schemas.microsoft.com/office/powerpoint/2010/main" val="3242770010"/>
+      </p:ext>
+    </p:extLst>
+  </p:cSld>
+  <p:clrMapOvr>
+    <a:masterClrMapping/>
+  </p:clrMapOvr>
+</p:sld>
+</file>
+
+<file path=ppt/slides/slide7.xml><?xml version="1.0" encoding="utf-8"?>
+<p:sld xmlns:a="http://schemas.openxmlformats.org/drawingml/2006/main" xmlns:r="http://schemas.openxmlformats.org/officeDocument/2006/relationships" xmlns:p="http://schemas.openxmlformats.org/presentationml/2006/main">
+  <p:cSld>
+    <p:spTree>
+      <p:nvGrpSpPr>
+        <p:cNvPr id="1" name="">
+          <a:extLst>
+            <a:ext uri="{FF2B5EF4-FFF2-40B4-BE49-F238E27FC236}">
+              <a16:creationId xmlns:a16="http://schemas.microsoft.com/office/drawing/2014/main" id="{AE18AC24-1D58-7A22-0416-243EAF4A06F4}"/>
+            </a:ext>
+          </a:extLst>
+        </p:cNvPr>
+        <p:cNvGrpSpPr/>
+        <p:nvPr/>
+      </p:nvGrpSpPr>
+      <p:grpSpPr>
+        <a:xfrm>
+          <a:off x="0" y="0"/>
+          <a:ext cx="0" cy="0"/>
+          <a:chOff x="0" y="0"/>
+          <a:chExt cx="0" cy="0"/>
+        </a:xfrm>
+      </p:grpSpPr>
+      <p:sp>
+        <p:nvSpPr>
+          <p:cNvPr id="2" name="TextBox 1">
+            <a:extLst>
+              <a:ext uri="{FF2B5EF4-FFF2-40B4-BE49-F238E27FC236}">
+                <a16:creationId xmlns:a16="http://schemas.microsoft.com/office/drawing/2014/main" id="{3B78B117-B3A9-84FC-80BD-FC81DC5C476E}"/>
+              </a:ext>
+            </a:extLst>
+          </p:cNvPr>
+          <p:cNvSpPr txBox="1"/>
+          <p:nvPr/>
+        </p:nvSpPr>
+        <p:spPr>
+          <a:xfrm>
+            <a:off x="806238" y="398204"/>
+            <a:ext cx="8768068" cy="646331"/>
+          </a:xfrm>
+          <a:prstGeom prst="rect">
+            <a:avLst/>
+          </a:prstGeom>
+          <a:noFill/>
+        </p:spPr>
+        <p:txBody>
+          <a:bodyPr wrap="square" rtlCol="0">
+            <a:spAutoFit/>
+          </a:bodyPr>
+          <a:lstStyle/>
+          <a:p>
+            <a:pPr marL="571500" indent="-571500">
+              <a:buFont typeface="Wingdings" panose="05000000000000000000" pitchFamily="2" charset="2"/>
+              <a:buChar char="v"/>
+            </a:pPr>
+            <a:r>
+              <a:rPr lang="en-US" sz="3600" dirty="0">
+                <a:solidFill>
+                  <a:schemeClr val="tx2"/>
+                </a:solidFill>
+                <a:latin typeface="Nirmala UI" panose="020B0502040204020203" pitchFamily="34" charset="0"/>
+                <a:ea typeface="Nirmala UI" panose="020B0502040204020203" pitchFamily="34" charset="0"/>
+                <a:cs typeface="Nirmala UI" panose="020B0502040204020203" pitchFamily="34" charset="0"/>
+              </a:rPr>
+              <a:t>Entity Relationship Diagram (ERD)</a:t>
+            </a:r>
+          </a:p>
+        </p:txBody>
+      </p:sp>
+      <p:pic>
+        <p:nvPicPr>
+          <p:cNvPr id="5" name="Picture 4">
+            <a:extLst>
+              <a:ext uri="{FF2B5EF4-FFF2-40B4-BE49-F238E27FC236}">
+                <a16:creationId xmlns:a16="http://schemas.microsoft.com/office/drawing/2014/main" id="{7DCD6CF9-D931-478A-9524-D01DFA051FAE}"/>
+              </a:ext>
+            </a:extLst>
+          </p:cNvPr>
+          <p:cNvPicPr>
+            <a:picLocks noChangeAspect="1"/>
+          </p:cNvPicPr>
+          <p:nvPr/>
+        </p:nvPicPr>
+        <p:blipFill>
+          <a:blip r:embed="rId2">
+            <a:extLst>
+              <a:ext uri="{28A0092B-C50C-407E-A947-70E740481C1C}">
+                <a14:useLocalDpi xmlns:a14="http://schemas.microsoft.com/office/drawing/2010/main" val="0"/>
+              </a:ext>
+            </a:extLst>
+          </a:blip>
+          <a:stretch>
+            <a:fillRect/>
+          </a:stretch>
+        </p:blipFill>
+        <p:spPr>
+          <a:xfrm>
+            <a:off x="955129" y="1198610"/>
+            <a:ext cx="7812353" cy="5210899"/>
+          </a:xfrm>
+          <a:prstGeom prst="rect">
+            <a:avLst/>
+          </a:prstGeom>
+        </p:spPr>
+      </p:pic>
+      <p:sp>
+        <p:nvSpPr>
+          <p:cNvPr id="6" name="TextBox 5">
+            <a:extLst>
+              <a:ext uri="{FF2B5EF4-FFF2-40B4-BE49-F238E27FC236}">
+                <a16:creationId xmlns:a16="http://schemas.microsoft.com/office/drawing/2014/main" id="{D1826992-804D-49BB-9F65-22B29356FCD1}"/>
+              </a:ext>
+            </a:extLst>
+          </p:cNvPr>
+          <p:cNvSpPr txBox="1"/>
+          <p:nvPr/>
+        </p:nvSpPr>
+        <p:spPr>
+          <a:xfrm>
+            <a:off x="968188" y="6436655"/>
+            <a:ext cx="7817224" cy="276999"/>
+          </a:xfrm>
+          <a:prstGeom prst="rect">
+            <a:avLst/>
+          </a:prstGeom>
+          <a:noFill/>
+        </p:spPr>
+        <p:txBody>
+          <a:bodyPr wrap="square" rtlCol="0">
+            <a:spAutoFit/>
+          </a:bodyPr>
+          <a:lstStyle/>
+          <a:p>
+            <a:r>
+              <a:rPr lang="en-US" sz="1200" b="1" dirty="0"/>
+              <a:t>Link: </a:t>
+            </a:r>
+            <a:r>
+              <a:rPr lang="en-US" sz="1200" i="1" dirty="0">
+                <a:hlinkClick r:id="rId3"/>
+              </a:rPr>
+              <a:t>https://dbdiagram.io/d/academic-journal-publishing-system-67faa04a4f7afba1845bbf05</a:t>
+            </a:r>
+            <a:endParaRPr lang="en-US" sz="1200" i="1" dirty="0"/>
+          </a:p>
+        </p:txBody>
+      </p:sp>
+      <p:sp>
+        <p:nvSpPr>
+          <p:cNvPr id="7" name="TextBox 6">
+            <a:extLst>
+              <a:ext uri="{FF2B5EF4-FFF2-40B4-BE49-F238E27FC236}">
+                <a16:creationId xmlns:a16="http://schemas.microsoft.com/office/drawing/2014/main" id="{1FE81D0E-2C4D-44B6-85E1-7F54D3744A3C}"/>
+              </a:ext>
+            </a:extLst>
+          </p:cNvPr>
+          <p:cNvSpPr txBox="1"/>
+          <p:nvPr/>
+        </p:nvSpPr>
+        <p:spPr>
+          <a:xfrm>
+            <a:off x="9018494" y="1389529"/>
+            <a:ext cx="2698377" cy="3970318"/>
+          </a:xfrm>
+          <a:prstGeom prst="rect">
+            <a:avLst/>
+          </a:prstGeom>
+          <a:noFill/>
+        </p:spPr>
+        <p:txBody>
+          <a:bodyPr wrap="square" rtlCol="0">
+            <a:spAutoFit/>
+          </a:bodyPr>
+          <a:lstStyle/>
+          <a:p>
+            <a:pPr>
+              <a:lnSpc>
+                <a:spcPct val="300000"/>
+              </a:lnSpc>
+            </a:pPr>
+            <a:r>
+              <a:rPr lang="en-US" b="1" dirty="0">
+                <a:solidFill>
+                  <a:schemeClr val="tx2"/>
+                </a:solidFill>
+              </a:rPr>
+              <a:t>Name of Tables:</a:t>
+            </a:r>
+          </a:p>
+          <a:p>
+            <a:pPr marL="285750" indent="-285750">
+              <a:buFont typeface="Wingdings" panose="05000000000000000000" pitchFamily="2" charset="2"/>
+              <a:buChar char="q"/>
+            </a:pPr>
+            <a:r>
+              <a:rPr lang="en-US" dirty="0"/>
+              <a:t>Users </a:t>
+            </a:r>
+          </a:p>
+          <a:p>
+            <a:pPr marL="285750" indent="-285750">
+              <a:buFont typeface="Wingdings" panose="05000000000000000000" pitchFamily="2" charset="2"/>
+              <a:buChar char="q"/>
+            </a:pPr>
+            <a:r>
+              <a:rPr lang="en-US" dirty="0"/>
+              <a:t>Journals </a:t>
+            </a:r>
+          </a:p>
+          <a:p>
+            <a:pPr marL="285750" indent="-285750">
+              <a:buFont typeface="Wingdings" panose="05000000000000000000" pitchFamily="2" charset="2"/>
+              <a:buChar char="q"/>
+            </a:pPr>
+            <a:r>
+              <a:rPr lang="en-US" dirty="0"/>
+              <a:t>Issues </a:t>
+            </a:r>
+          </a:p>
+          <a:p>
+            <a:pPr marL="285750" indent="-285750">
+              <a:buFont typeface="Wingdings" panose="05000000000000000000" pitchFamily="2" charset="2"/>
+              <a:buChar char="q"/>
+            </a:pPr>
+            <a:r>
+              <a:rPr lang="en-US" dirty="0"/>
+              <a:t>Articles </a:t>
+            </a:r>
+          </a:p>
+          <a:p>
+            <a:pPr marL="285750" indent="-285750">
+              <a:buFont typeface="Wingdings" panose="05000000000000000000" pitchFamily="2" charset="2"/>
+              <a:buChar char="q"/>
+            </a:pPr>
+            <a:r>
+              <a:rPr lang="en-US" dirty="0" err="1"/>
+              <a:t>Article_versions</a:t>
+            </a:r>
+            <a:r>
+              <a:rPr lang="en-US" dirty="0"/>
+              <a:t> </a:t>
+            </a:r>
+          </a:p>
+          <a:p>
+            <a:pPr marL="285750" indent="-285750">
+              <a:buFont typeface="Wingdings" panose="05000000000000000000" pitchFamily="2" charset="2"/>
+              <a:buChar char="q"/>
+            </a:pPr>
+            <a:r>
+              <a:rPr lang="en-US" dirty="0"/>
+              <a:t>Reviews </a:t>
+            </a:r>
+          </a:p>
+          <a:p>
+            <a:pPr marL="285750" indent="-285750">
+              <a:buFont typeface="Wingdings" panose="05000000000000000000" pitchFamily="2" charset="2"/>
+              <a:buChar char="q"/>
+            </a:pPr>
+            <a:r>
+              <a:rPr lang="en-US" dirty="0" err="1"/>
+              <a:t>Article_editors</a:t>
+            </a:r>
+            <a:r>
+              <a:rPr lang="en-US" dirty="0"/>
+              <a:t> </a:t>
+            </a:r>
+          </a:p>
+          <a:p>
+            <a:pPr marL="285750" indent="-285750">
+              <a:buFont typeface="Wingdings" panose="05000000000000000000" pitchFamily="2" charset="2"/>
+              <a:buChar char="q"/>
+            </a:pPr>
+            <a:r>
+              <a:rPr lang="en-US" dirty="0" err="1"/>
+              <a:t>Article_reviewers</a:t>
+            </a:r>
+            <a:r>
+              <a:rPr lang="en-US" dirty="0"/>
+              <a:t> </a:t>
+            </a:r>
+          </a:p>
+          <a:p>
+            <a:pPr marL="285750" indent="-285750">
+              <a:buFont typeface="Wingdings" panose="05000000000000000000" pitchFamily="2" charset="2"/>
+              <a:buChar char="q"/>
+            </a:pPr>
+            <a:r>
+              <a:rPr lang="en-US" dirty="0"/>
+              <a:t>Messages </a:t>
+            </a:r>
+          </a:p>
+          <a:p>
+            <a:pPr marL="285750" indent="-285750">
+              <a:buFont typeface="Wingdings" panose="05000000000000000000" pitchFamily="2" charset="2"/>
+              <a:buChar char="q"/>
+            </a:pPr>
+            <a:r>
+              <a:rPr lang="en-US" dirty="0"/>
+              <a:t>Payments </a:t>
+            </a:r>
+          </a:p>
+          <a:p>
+            <a:endParaRPr lang="en-US" dirty="0"/>
+          </a:p>
+        </p:txBody>
+      </p:sp>
+      <p:sp>
+        <p:nvSpPr>
+          <p:cNvPr id="8" name="Slide Number Placeholder 7">
+            <a:extLst>
+              <a:ext uri="{FF2B5EF4-FFF2-40B4-BE49-F238E27FC236}">
+                <a16:creationId xmlns:a16="http://schemas.microsoft.com/office/drawing/2014/main" id="{87120CA8-3398-4F5B-A206-92550BF0E849}"/>
+              </a:ext>
+            </a:extLst>
+          </p:cNvPr>
+          <p:cNvSpPr>
+            <a:spLocks noGrp="1"/>
+          </p:cNvSpPr>
+          <p:nvPr>
+            <p:ph type="sldNum" sz="quarter" idx="12"/>
+          </p:nvPr>
+        </p:nvSpPr>
+        <p:spPr/>
+        <p:txBody>
+          <a:bodyPr/>
+          <a:lstStyle/>
+          <a:p>
+            <a:fld id="{0F70F428-429A-4369-BFBB-0FC7FC84F61D}" type="slidenum">
+              <a:rPr lang="en-US" smtClean="0"/>
+              <a:t>7</a:t>
+            </a:fld>
+            <a:endParaRPr lang="en-US"/>
+          </a:p>
+        </p:txBody>
+      </p:sp>
+    </p:spTree>
+    <p:extLst>
+      <p:ext uri="{BB962C8B-B14F-4D97-AF65-F5344CB8AC3E}">
+        <p14:creationId xmlns:p14="http://schemas.microsoft.com/office/powerpoint/2010/main" val="2536284086"/>
       </p:ext>
     </p:extLst>
   </p:cSld>
@@ -6137,4 +7002,299 @@
     </a:ext>
   </a:extLst>
 </a:theme>
+</file>
+
+<file path=ppt/theme/theme2.xml><?xml version="1.0" encoding="utf-8"?>
+<a:theme xmlns:a="http://schemas.openxmlformats.org/drawingml/2006/main" name="Office Theme">
+  <a:themeElements>
+    <a:clrScheme name="Office">
+      <a:dk1>
+        <a:sysClr val="windowText" lastClr="000000"/>
+      </a:dk1>
+      <a:lt1>
+        <a:sysClr val="window" lastClr="FFFFFF"/>
+      </a:lt1>
+      <a:dk2>
+        <a:srgbClr val="44546A"/>
+      </a:dk2>
+      <a:lt2>
+        <a:srgbClr val="E7E6E6"/>
+      </a:lt2>
+      <a:accent1>
+        <a:srgbClr val="4472C4"/>
+      </a:accent1>
+      <a:accent2>
+        <a:srgbClr val="ED7D31"/>
+      </a:accent2>
+      <a:accent3>
+        <a:srgbClr val="A5A5A5"/>
+      </a:accent3>
+      <a:accent4>
+        <a:srgbClr val="FFC000"/>
+      </a:accent4>
+      <a:accent5>
+        <a:srgbClr val="5B9BD5"/>
+      </a:accent5>
+      <a:accent6>
+        <a:srgbClr val="70AD47"/>
+      </a:accent6>
+      <a:hlink>
+        <a:srgbClr val="0563C1"/>
+      </a:hlink>
+      <a:folHlink>
+        <a:srgbClr val="954F72"/>
+      </a:folHlink>
+    </a:clrScheme>
+    <a:fontScheme name="Office">
+      <a:majorFont>
+        <a:latin typeface="Calibri Light" panose="020F0302020204030204"/>
+        <a:ea typeface=""/>
+        <a:cs typeface=""/>
+        <a:font script="Jpan" typeface="游ゴシック Light"/>
+        <a:font script="Hang" typeface="맑은 고딕"/>
+        <a:font script="Hans" typeface="等线 Light"/>
+        <a:font script="Hant" typeface="新細明體"/>
+        <a:font script="Arab" typeface="Times New Roman"/>
+        <a:font script="Hebr" typeface="Times New Roman"/>
+        <a:font script="Thai" typeface="Angsana New"/>
+        <a:font script="Ethi" typeface="Nyala"/>
+        <a:font script="Beng" typeface="Vrinda"/>
+        <a:font script="Gujr" typeface="Shruti"/>
+        <a:font script="Khmr" typeface="MoolBoran"/>
+        <a:font script="Knda" typeface="Tunga"/>
+        <a:font script="Guru" typeface="Raavi"/>
+        <a:font script="Cans" typeface="Euphemia"/>
+        <a:font script="Cher" typeface="Plantagenet Cherokee"/>
+        <a:font script="Yiii" typeface="Microsoft Yi Baiti"/>
+        <a:font script="Tibt" typeface="Microsoft Himalaya"/>
+        <a:font script="Thaa" typeface="MV Boli"/>
+        <a:font script="Deva" typeface="Mangal"/>
+        <a:font script="Telu" typeface="Gautami"/>
+        <a:font script="Taml" typeface="Latha"/>
+        <a:font script="Syrc" typeface="Estrangelo Edessa"/>
+        <a:font script="Orya" typeface="Kalinga"/>
+        <a:font script="Mlym" typeface="Kartika"/>
+        <a:font script="Laoo" typeface="DokChampa"/>
+        <a:font script="Sinh" typeface="Iskoola Pota"/>
+        <a:font script="Mong" typeface="Mongolian Baiti"/>
+        <a:font script="Viet" typeface="Times New Roman"/>
+        <a:font script="Uigh" typeface="Microsoft Uighur"/>
+        <a:font script="Geor" typeface="Sylfaen"/>
+        <a:font script="Armn" typeface="Arial"/>
+        <a:font script="Bugi" typeface="Leelawadee UI"/>
+        <a:font script="Bopo" typeface="Microsoft JhengHei"/>
+        <a:font script="Java" typeface="Javanese Text"/>
+        <a:font script="Lisu" typeface="Segoe UI"/>
+        <a:font script="Mymr" typeface="Myanmar Text"/>
+        <a:font script="Nkoo" typeface="Ebrima"/>
+        <a:font script="Olck" typeface="Nirmala UI"/>
+        <a:font script="Osma" typeface="Ebrima"/>
+        <a:font script="Phag" typeface="Phagspa"/>
+        <a:font script="Syrn" typeface="Estrangelo Edessa"/>
+        <a:font script="Syrj" typeface="Estrangelo Edessa"/>
+        <a:font script="Syre" typeface="Estrangelo Edessa"/>
+        <a:font script="Sora" typeface="Nirmala UI"/>
+        <a:font script="Tale" typeface="Microsoft Tai Le"/>
+        <a:font script="Talu" typeface="Microsoft New Tai Lue"/>
+        <a:font script="Tfng" typeface="Ebrima"/>
+      </a:majorFont>
+      <a:minorFont>
+        <a:latin typeface="Calibri" panose="020F0502020204030204"/>
+        <a:ea typeface=""/>
+        <a:cs typeface=""/>
+        <a:font script="Jpan" typeface="游ゴシック"/>
+        <a:font script="Hang" typeface="맑은 고딕"/>
+        <a:font script="Hans" typeface="等线"/>
+        <a:font script="Hant" typeface="新細明體"/>
+        <a:font script="Arab" typeface="Arial"/>
+        <a:font script="Hebr" typeface="Arial"/>
+        <a:font script="Thai" typeface="Cordia New"/>
+        <a:font script="Ethi" typeface="Nyala"/>
+        <a:font script="Beng" typeface="Vrinda"/>
+        <a:font script="Gujr" typeface="Shruti"/>
+        <a:font script="Khmr" typeface="DaunPenh"/>
+        <a:font script="Knda" typeface="Tunga"/>
+        <a:font script="Guru" typeface="Raavi"/>
+        <a:font script="Cans" typeface="Euphemia"/>
+        <a:font script="Cher" typeface="Plantagenet Cherokee"/>
+        <a:font script="Yiii" typeface="Microsoft Yi Baiti"/>
+        <a:font script="Tibt" typeface="Microsoft Himalaya"/>
+        <a:font script="Thaa" typeface="MV Boli"/>
+        <a:font script="Deva" typeface="Mangal"/>
+        <a:font script="Telu" typeface="Gautami"/>
+        <a:font script="Taml" typeface="Latha"/>
+        <a:font script="Syrc" typeface="Estrangelo Edessa"/>
+        <a:font script="Orya" typeface="Kalinga"/>
+        <a:font script="Mlym" typeface="Kartika"/>
+        <a:font script="Laoo" typeface="DokChampa"/>
+        <a:font script="Sinh" typeface="Iskoola Pota"/>
+        <a:font script="Mong" typeface="Mongolian Baiti"/>
+        <a:font script="Viet" typeface="Arial"/>
+        <a:font script="Uigh" typeface="Microsoft Uighur"/>
+        <a:font script="Geor" typeface="Sylfaen"/>
+        <a:font script="Armn" typeface="Arial"/>
+        <a:font script="Bugi" typeface="Leelawadee UI"/>
+        <a:font script="Bopo" typeface="Microsoft JhengHei"/>
+        <a:font script="Java" typeface="Javanese Text"/>
+        <a:font script="Lisu" typeface="Segoe UI"/>
+        <a:font script="Mymr" typeface="Myanmar Text"/>
+        <a:font script="Nkoo" typeface="Ebrima"/>
+        <a:font script="Olck" typeface="Nirmala UI"/>
+        <a:font script="Osma" typeface="Ebrima"/>
+        <a:font script="Phag" typeface="Phagspa"/>
+        <a:font script="Syrn" typeface="Estrangelo Edessa"/>
+        <a:font script="Syrj" typeface="Estrangelo Edessa"/>
+        <a:font script="Syre" typeface="Estrangelo Edessa"/>
+        <a:font script="Sora" typeface="Nirmala UI"/>
+        <a:font script="Tale" typeface="Microsoft Tai Le"/>
+        <a:font script="Talu" typeface="Microsoft New Tai Lue"/>
+        <a:font script="Tfng" typeface="Ebrima"/>
+      </a:minorFont>
+    </a:fontScheme>
+    <a:fmtScheme name="Office">
+      <a:fillStyleLst>
+        <a:solidFill>
+          <a:schemeClr val="phClr"/>
+        </a:solidFill>
+        <a:gradFill rotWithShape="1">
+          <a:gsLst>
+            <a:gs pos="0">
+              <a:schemeClr val="phClr">
+                <a:lumMod val="110000"/>
+                <a:satMod val="105000"/>
+                <a:tint val="67000"/>
+              </a:schemeClr>
+            </a:gs>
+            <a:gs pos="50000">
+              <a:schemeClr val="phClr">
+                <a:lumMod val="105000"/>
+                <a:satMod val="103000"/>
+                <a:tint val="73000"/>
+              </a:schemeClr>
+            </a:gs>
+            <a:gs pos="100000">
+              <a:schemeClr val="phClr">
+                <a:lumMod val="105000"/>
+                <a:satMod val="109000"/>
+                <a:tint val="81000"/>
+              </a:schemeClr>
+            </a:gs>
+          </a:gsLst>
+          <a:lin ang="5400000" scaled="0"/>
+        </a:gradFill>
+        <a:gradFill rotWithShape="1">
+          <a:gsLst>
+            <a:gs pos="0">
+              <a:schemeClr val="phClr">
+                <a:satMod val="103000"/>
+                <a:lumMod val="102000"/>
+                <a:tint val="94000"/>
+              </a:schemeClr>
+            </a:gs>
+            <a:gs pos="50000">
+              <a:schemeClr val="phClr">
+                <a:satMod val="110000"/>
+                <a:lumMod val="100000"/>
+                <a:shade val="100000"/>
+              </a:schemeClr>
+            </a:gs>
+            <a:gs pos="100000">
+              <a:schemeClr val="phClr">
+                <a:lumMod val="99000"/>
+                <a:satMod val="120000"/>
+                <a:shade val="78000"/>
+              </a:schemeClr>
+            </a:gs>
+          </a:gsLst>
+          <a:lin ang="5400000" scaled="0"/>
+        </a:gradFill>
+      </a:fillStyleLst>
+      <a:lnStyleLst>
+        <a:ln w="6350" cap="flat" cmpd="sng" algn="ctr">
+          <a:solidFill>
+            <a:schemeClr val="phClr"/>
+          </a:solidFill>
+          <a:prstDash val="solid"/>
+          <a:miter lim="800000"/>
+        </a:ln>
+        <a:ln w="12700" cap="flat" cmpd="sng" algn="ctr">
+          <a:solidFill>
+            <a:schemeClr val="phClr"/>
+          </a:solidFill>
+          <a:prstDash val="solid"/>
+          <a:miter lim="800000"/>
+        </a:ln>
+        <a:ln w="19050" cap="flat" cmpd="sng" algn="ctr">
+          <a:solidFill>
+            <a:schemeClr val="phClr"/>
+          </a:solidFill>
+          <a:prstDash val="solid"/>
+          <a:miter lim="800000"/>
+        </a:ln>
+      </a:lnStyleLst>
+      <a:effectStyleLst>
+        <a:effectStyle>
+          <a:effectLst/>
+        </a:effectStyle>
+        <a:effectStyle>
+          <a:effectLst/>
+        </a:effectStyle>
+        <a:effectStyle>
+          <a:effectLst>
+            <a:outerShdw blurRad="57150" dist="19050" dir="5400000" algn="ctr" rotWithShape="0">
+              <a:srgbClr val="000000">
+                <a:alpha val="63000"/>
+              </a:srgbClr>
+            </a:outerShdw>
+          </a:effectLst>
+        </a:effectStyle>
+      </a:effectStyleLst>
+      <a:bgFillStyleLst>
+        <a:solidFill>
+          <a:schemeClr val="phClr"/>
+        </a:solidFill>
+        <a:solidFill>
+          <a:schemeClr val="phClr">
+            <a:tint val="95000"/>
+            <a:satMod val="170000"/>
+          </a:schemeClr>
+        </a:solidFill>
+        <a:gradFill rotWithShape="1">
+          <a:gsLst>
+            <a:gs pos="0">
+              <a:schemeClr val="phClr">
+                <a:tint val="93000"/>
+                <a:satMod val="150000"/>
+                <a:shade val="98000"/>
+                <a:lumMod val="102000"/>
+              </a:schemeClr>
+            </a:gs>
+            <a:gs pos="50000">
+              <a:schemeClr val="phClr">
+                <a:tint val="98000"/>
+                <a:satMod val="130000"/>
+                <a:shade val="90000"/>
+                <a:lumMod val="103000"/>
+              </a:schemeClr>
+            </a:gs>
+            <a:gs pos="100000">
+              <a:schemeClr val="phClr">
+                <a:shade val="63000"/>
+                <a:satMod val="120000"/>
+              </a:schemeClr>
+            </a:gs>
+          </a:gsLst>
+          <a:lin ang="5400000" scaled="0"/>
+        </a:gradFill>
+      </a:bgFillStyleLst>
+    </a:fmtScheme>
+  </a:themeElements>
+  <a:objectDefaults/>
+  <a:extraClrSchemeLst/>
+  <a:extLst>
+    <a:ext uri="{05A4C25C-085E-4340-85A3-A5531E510DB2}">
+      <thm15:themeFamily xmlns:thm15="http://schemas.microsoft.com/office/thememl/2012/main" name="Office Theme" id="{62F939B6-93AF-4DB8-9C6B-D6C7DFDC589F}" vid="{4A3C46E8-61CC-4603-A589-7422A47A8E4A}"/>
+    </a:ext>
+  </a:extLst>
+</a:theme>
 </file>
</xml_diff>

<commit_message>
activity diagram added and ppt modified
</commit_message>
<xml_diff>
--- a/Presentation Slides/1285464_Academic_Journal_Publication_System.pptx
+++ b/Presentation Slides/1285464_Academic_Journal_Publication_System.pptx
@@ -5,7 +5,7 @@
     <p:sldMasterId id="2147483648" r:id="rId1"/>
   </p:sldMasterIdLst>
   <p:notesMasterIdLst>
-    <p:notesMasterId r:id="rId9"/>
+    <p:notesMasterId r:id="rId11"/>
   </p:notesMasterIdLst>
   <p:sldIdLst>
     <p:sldId id="256" r:id="rId2"/>
@@ -15,6 +15,8 @@
     <p:sldId id="261" r:id="rId6"/>
     <p:sldId id="262" r:id="rId7"/>
     <p:sldId id="263" r:id="rId8"/>
+    <p:sldId id="264" r:id="rId9"/>
+    <p:sldId id="265" r:id="rId10"/>
   </p:sldIdLst>
   <p:sldSz cx="12192000" cy="6858000"/>
   <p:notesSz cx="6858000" cy="9144000"/>
@@ -6461,8 +6463,10 @@
             <a:off x="955129" y="1198610"/>
             <a:ext cx="7812353" cy="5210899"/>
           </a:xfrm>
-          <a:prstGeom prst="rect">
-            <a:avLst/>
+          <a:prstGeom prst="roundRect">
+            <a:avLst>
+              <a:gd name="adj" fmla="val 3648"/>
+            </a:avLst>
           </a:prstGeom>
         </p:spPr>
       </p:pic>
@@ -6700,6 +6704,344 @@
     <p:extLst>
       <p:ext uri="{BB962C8B-B14F-4D97-AF65-F5344CB8AC3E}">
         <p14:creationId xmlns:p14="http://schemas.microsoft.com/office/powerpoint/2010/main" val="2536284086"/>
+      </p:ext>
+    </p:extLst>
+  </p:cSld>
+  <p:clrMapOvr>
+    <a:masterClrMapping/>
+  </p:clrMapOvr>
+</p:sld>
+</file>
+
+<file path=ppt/slides/slide8.xml><?xml version="1.0" encoding="utf-8"?>
+<p:sld xmlns:a="http://schemas.openxmlformats.org/drawingml/2006/main" xmlns:r="http://schemas.openxmlformats.org/officeDocument/2006/relationships" xmlns:p="http://schemas.openxmlformats.org/presentationml/2006/main">
+  <p:cSld>
+    <p:spTree>
+      <p:nvGrpSpPr>
+        <p:cNvPr id="1" name="">
+          <a:extLst>
+            <a:ext uri="{FF2B5EF4-FFF2-40B4-BE49-F238E27FC236}">
+              <a16:creationId xmlns:a16="http://schemas.microsoft.com/office/drawing/2014/main" id="{E7A108B0-775F-0956-3A22-874D2D717F9D}"/>
+            </a:ext>
+          </a:extLst>
+        </p:cNvPr>
+        <p:cNvGrpSpPr/>
+        <p:nvPr/>
+      </p:nvGrpSpPr>
+      <p:grpSpPr>
+        <a:xfrm>
+          <a:off x="0" y="0"/>
+          <a:ext cx="0" cy="0"/>
+          <a:chOff x="0" y="0"/>
+          <a:chExt cx="0" cy="0"/>
+        </a:xfrm>
+      </p:grpSpPr>
+      <p:sp>
+        <p:nvSpPr>
+          <p:cNvPr id="2" name="TextBox 1">
+            <a:extLst>
+              <a:ext uri="{FF2B5EF4-FFF2-40B4-BE49-F238E27FC236}">
+                <a16:creationId xmlns:a16="http://schemas.microsoft.com/office/drawing/2014/main" id="{B3E7D0FC-1C50-AE8D-E12C-DA43E173A2F3}"/>
+              </a:ext>
+            </a:extLst>
+          </p:cNvPr>
+          <p:cNvSpPr txBox="1"/>
+          <p:nvPr/>
+        </p:nvSpPr>
+        <p:spPr>
+          <a:xfrm>
+            <a:off x="806238" y="398204"/>
+            <a:ext cx="8768068" cy="646331"/>
+          </a:xfrm>
+          <a:prstGeom prst="rect">
+            <a:avLst/>
+          </a:prstGeom>
+          <a:noFill/>
+        </p:spPr>
+        <p:txBody>
+          <a:bodyPr wrap="square" rtlCol="0">
+            <a:spAutoFit/>
+          </a:bodyPr>
+          <a:lstStyle/>
+          <a:p>
+            <a:pPr marL="571500" indent="-571500">
+              <a:buFont typeface="Wingdings" panose="05000000000000000000" pitchFamily="2" charset="2"/>
+              <a:buChar char="v"/>
+            </a:pPr>
+            <a:r>
+              <a:rPr lang="en-US" sz="3600" dirty="0">
+                <a:solidFill>
+                  <a:schemeClr val="tx2"/>
+                </a:solidFill>
+                <a:latin typeface="Nirmala UI" panose="020B0502040204020203" pitchFamily="34" charset="0"/>
+                <a:ea typeface="Nirmala UI" panose="020B0502040204020203" pitchFamily="34" charset="0"/>
+                <a:cs typeface="Nirmala UI" panose="020B0502040204020203" pitchFamily="34" charset="0"/>
+              </a:rPr>
+              <a:t>Activity Diagram (1/2)</a:t>
+            </a:r>
+          </a:p>
+        </p:txBody>
+      </p:sp>
+      <p:sp>
+        <p:nvSpPr>
+          <p:cNvPr id="8" name="Slide Number Placeholder 7">
+            <a:extLst>
+              <a:ext uri="{FF2B5EF4-FFF2-40B4-BE49-F238E27FC236}">
+                <a16:creationId xmlns:a16="http://schemas.microsoft.com/office/drawing/2014/main" id="{465A6609-9DEA-EDFC-A542-EC5517425025}"/>
+              </a:ext>
+            </a:extLst>
+          </p:cNvPr>
+          <p:cNvSpPr>
+            <a:spLocks noGrp="1"/>
+          </p:cNvSpPr>
+          <p:nvPr>
+            <p:ph type="sldNum" sz="quarter" idx="12"/>
+          </p:nvPr>
+        </p:nvSpPr>
+        <p:spPr/>
+        <p:txBody>
+          <a:bodyPr/>
+          <a:lstStyle/>
+          <a:p>
+            <a:fld id="{0F70F428-429A-4369-BFBB-0FC7FC84F61D}" type="slidenum">
+              <a:rPr lang="en-US" smtClean="0"/>
+              <a:t>8</a:t>
+            </a:fld>
+            <a:endParaRPr lang="en-US"/>
+          </a:p>
+        </p:txBody>
+      </p:sp>
+      <p:pic>
+        <p:nvPicPr>
+          <p:cNvPr id="4" name="Picture 3">
+            <a:extLst>
+              <a:ext uri="{FF2B5EF4-FFF2-40B4-BE49-F238E27FC236}">
+                <a16:creationId xmlns:a16="http://schemas.microsoft.com/office/drawing/2014/main" id="{9DB2F756-8D04-39D3-A5F8-2D8C97CCE2D0}"/>
+              </a:ext>
+            </a:extLst>
+          </p:cNvPr>
+          <p:cNvPicPr>
+            <a:picLocks noChangeAspect="1"/>
+          </p:cNvPicPr>
+          <p:nvPr/>
+        </p:nvPicPr>
+        <p:blipFill>
+          <a:blip r:embed="rId2">
+            <a:extLst>
+              <a:ext uri="{28A0092B-C50C-407E-A947-70E740481C1C}">
+                <a14:useLocalDpi xmlns:a14="http://schemas.microsoft.com/office/drawing/2010/main" val="0"/>
+              </a:ext>
+            </a:extLst>
+          </a:blip>
+          <a:srcRect b="44246"/>
+          <a:stretch/>
+        </p:blipFill>
+        <p:spPr>
+          <a:xfrm>
+            <a:off x="838200" y="1457284"/>
+            <a:ext cx="10515600" cy="4899066"/>
+          </a:xfrm>
+          <a:prstGeom prst="roundRect">
+            <a:avLst>
+              <a:gd name="adj" fmla="val 3421"/>
+            </a:avLst>
+          </a:prstGeom>
+        </p:spPr>
+      </p:pic>
+    </p:spTree>
+    <p:extLst>
+      <p:ext uri="{BB962C8B-B14F-4D97-AF65-F5344CB8AC3E}">
+        <p14:creationId xmlns:p14="http://schemas.microsoft.com/office/powerpoint/2010/main" val="1682220572"/>
+      </p:ext>
+    </p:extLst>
+  </p:cSld>
+  <p:clrMapOvr>
+    <a:masterClrMapping/>
+  </p:clrMapOvr>
+</p:sld>
+</file>
+
+<file path=ppt/slides/slide9.xml><?xml version="1.0" encoding="utf-8"?>
+<p:sld xmlns:a="http://schemas.openxmlformats.org/drawingml/2006/main" xmlns:r="http://schemas.openxmlformats.org/officeDocument/2006/relationships" xmlns:p="http://schemas.openxmlformats.org/presentationml/2006/main">
+  <p:cSld>
+    <p:spTree>
+      <p:nvGrpSpPr>
+        <p:cNvPr id="1" name="">
+          <a:extLst>
+            <a:ext uri="{FF2B5EF4-FFF2-40B4-BE49-F238E27FC236}">
+              <a16:creationId xmlns:a16="http://schemas.microsoft.com/office/drawing/2014/main" id="{7444AE0A-EAB6-E0EE-56D0-9394ED821B68}"/>
+            </a:ext>
+          </a:extLst>
+        </p:cNvPr>
+        <p:cNvGrpSpPr/>
+        <p:nvPr/>
+      </p:nvGrpSpPr>
+      <p:grpSpPr>
+        <a:xfrm>
+          <a:off x="0" y="0"/>
+          <a:ext cx="0" cy="0"/>
+          <a:chOff x="0" y="0"/>
+          <a:chExt cx="0" cy="0"/>
+        </a:xfrm>
+      </p:grpSpPr>
+      <p:sp>
+        <p:nvSpPr>
+          <p:cNvPr id="2" name="TextBox 1">
+            <a:extLst>
+              <a:ext uri="{FF2B5EF4-FFF2-40B4-BE49-F238E27FC236}">
+                <a16:creationId xmlns:a16="http://schemas.microsoft.com/office/drawing/2014/main" id="{FA3C1ADA-2C08-C764-8630-E7E729205F8B}"/>
+              </a:ext>
+            </a:extLst>
+          </p:cNvPr>
+          <p:cNvSpPr txBox="1"/>
+          <p:nvPr/>
+        </p:nvSpPr>
+        <p:spPr>
+          <a:xfrm>
+            <a:off x="806238" y="398204"/>
+            <a:ext cx="8768068" cy="646331"/>
+          </a:xfrm>
+          <a:prstGeom prst="rect">
+            <a:avLst/>
+          </a:prstGeom>
+          <a:noFill/>
+        </p:spPr>
+        <p:txBody>
+          <a:bodyPr wrap="square" rtlCol="0">
+            <a:spAutoFit/>
+          </a:bodyPr>
+          <a:lstStyle/>
+          <a:p>
+            <a:pPr marL="571500" indent="-571500">
+              <a:buFont typeface="Wingdings" panose="05000000000000000000" pitchFamily="2" charset="2"/>
+              <a:buChar char="v"/>
+            </a:pPr>
+            <a:r>
+              <a:rPr lang="en-US" sz="3600" dirty="0">
+                <a:solidFill>
+                  <a:schemeClr val="tx2"/>
+                </a:solidFill>
+                <a:latin typeface="Nirmala UI" panose="020B0502040204020203" pitchFamily="34" charset="0"/>
+                <a:ea typeface="Nirmala UI" panose="020B0502040204020203" pitchFamily="34" charset="0"/>
+                <a:cs typeface="Nirmala UI" panose="020B0502040204020203" pitchFamily="34" charset="0"/>
+              </a:rPr>
+              <a:t>Activity Diagram (2/2)</a:t>
+            </a:r>
+          </a:p>
+        </p:txBody>
+      </p:sp>
+      <p:sp>
+        <p:nvSpPr>
+          <p:cNvPr id="8" name="Slide Number Placeholder 7">
+            <a:extLst>
+              <a:ext uri="{FF2B5EF4-FFF2-40B4-BE49-F238E27FC236}">
+                <a16:creationId xmlns:a16="http://schemas.microsoft.com/office/drawing/2014/main" id="{46A5AB0E-B937-8046-76DB-8ECA7B12BAD7}"/>
+              </a:ext>
+            </a:extLst>
+          </p:cNvPr>
+          <p:cNvSpPr>
+            <a:spLocks noGrp="1"/>
+          </p:cNvSpPr>
+          <p:nvPr>
+            <p:ph type="sldNum" sz="quarter" idx="12"/>
+          </p:nvPr>
+        </p:nvSpPr>
+        <p:spPr/>
+        <p:txBody>
+          <a:bodyPr/>
+          <a:lstStyle/>
+          <a:p>
+            <a:fld id="{0F70F428-429A-4369-BFBB-0FC7FC84F61D}" type="slidenum">
+              <a:rPr lang="en-US" smtClean="0"/>
+              <a:t>9</a:t>
+            </a:fld>
+            <a:endParaRPr lang="en-US"/>
+          </a:p>
+        </p:txBody>
+      </p:sp>
+      <p:pic>
+        <p:nvPicPr>
+          <p:cNvPr id="4" name="Picture 3">
+            <a:extLst>
+              <a:ext uri="{FF2B5EF4-FFF2-40B4-BE49-F238E27FC236}">
+                <a16:creationId xmlns:a16="http://schemas.microsoft.com/office/drawing/2014/main" id="{3BB42F88-5994-49A3-F16D-7D0D82FF2E8B}"/>
+              </a:ext>
+            </a:extLst>
+          </p:cNvPr>
+          <p:cNvPicPr>
+            <a:picLocks noChangeAspect="1"/>
+          </p:cNvPicPr>
+          <p:nvPr/>
+        </p:nvPicPr>
+        <p:blipFill>
+          <a:blip r:embed="rId2">
+            <a:extLst>
+              <a:ext uri="{28A0092B-C50C-407E-A947-70E740481C1C}">
+                <a14:useLocalDpi xmlns:a14="http://schemas.microsoft.com/office/drawing/2010/main" val="0"/>
+              </a:ext>
+            </a:extLst>
+          </a:blip>
+          <a:srcRect t="55752" b="-65"/>
+          <a:stretch/>
+        </p:blipFill>
+        <p:spPr>
+          <a:xfrm>
+            <a:off x="838200" y="1786744"/>
+            <a:ext cx="10515600" cy="3893778"/>
+          </a:xfrm>
+          <a:prstGeom prst="roundRect">
+            <a:avLst>
+              <a:gd name="adj" fmla="val 4168"/>
+            </a:avLst>
+          </a:prstGeom>
+        </p:spPr>
+      </p:pic>
+      <p:sp>
+        <p:nvSpPr>
+          <p:cNvPr id="3" name="TextBox 2">
+            <a:extLst>
+              <a:ext uri="{FF2B5EF4-FFF2-40B4-BE49-F238E27FC236}">
+                <a16:creationId xmlns:a16="http://schemas.microsoft.com/office/drawing/2014/main" id="{1BE26878-66B6-46E0-8DE8-C8BEB3A26620}"/>
+              </a:ext>
+            </a:extLst>
+          </p:cNvPr>
+          <p:cNvSpPr txBox="1"/>
+          <p:nvPr/>
+        </p:nvSpPr>
+        <p:spPr>
+          <a:xfrm>
+            <a:off x="838200" y="5813465"/>
+            <a:ext cx="9851923" cy="276999"/>
+          </a:xfrm>
+          <a:prstGeom prst="rect">
+            <a:avLst/>
+          </a:prstGeom>
+          <a:noFill/>
+        </p:spPr>
+        <p:txBody>
+          <a:bodyPr wrap="square" rtlCol="0">
+            <a:spAutoFit/>
+          </a:bodyPr>
+          <a:lstStyle/>
+          <a:p>
+            <a:r>
+              <a:rPr lang="en-US" sz="1200" dirty="0"/>
+              <a:t>Link: </a:t>
+            </a:r>
+            <a:r>
+              <a:rPr lang="en-US" sz="1200" dirty="0">
+                <a:hlinkClick r:id="rId3"/>
+              </a:rPr>
+              <a:t>https://drive.google.com/file/d/1PhhfahGCpKClnOeQA3EyesVWGl7QwW9T/view?usp=sharing</a:t>
+            </a:r>
+            <a:endParaRPr lang="en-US" sz="1200" dirty="0"/>
+          </a:p>
+        </p:txBody>
+      </p:sp>
+    </p:spTree>
+    <p:extLst>
+      <p:ext uri="{BB962C8B-B14F-4D97-AF65-F5344CB8AC3E}">
+        <p14:creationId xmlns:p14="http://schemas.microsoft.com/office/powerpoint/2010/main" val="2821629444"/>
       </p:ext>
     </p:extLst>
   </p:cSld>

</xml_diff>

<commit_message>
frontend component design updated and ppt complete
</commit_message>
<xml_diff>
--- a/Presentation Slides/1285464_Academic_Journal_Publication_System.pptx
+++ b/Presentation Slides/1285464_Academic_Journal_Publication_System.pptx
@@ -5,7 +5,7 @@
     <p:sldMasterId id="2147483648" r:id="rId1"/>
   </p:sldMasterIdLst>
   <p:notesMasterIdLst>
-    <p:notesMasterId r:id="rId11"/>
+    <p:notesMasterId r:id="rId18"/>
   </p:notesMasterIdLst>
   <p:sldIdLst>
     <p:sldId id="256" r:id="rId2"/>
@@ -17,6 +17,13 @@
     <p:sldId id="263" r:id="rId8"/>
     <p:sldId id="264" r:id="rId9"/>
     <p:sldId id="265" r:id="rId10"/>
+    <p:sldId id="266" r:id="rId11"/>
+    <p:sldId id="267" r:id="rId12"/>
+    <p:sldId id="268" r:id="rId13"/>
+    <p:sldId id="269" r:id="rId14"/>
+    <p:sldId id="270" r:id="rId15"/>
+    <p:sldId id="271" r:id="rId16"/>
+    <p:sldId id="272" r:id="rId17"/>
   </p:sldIdLst>
   <p:sldSz cx="12192000" cy="6858000"/>
   <p:notesSz cx="6858000" cy="9144000"/>
@@ -205,7 +212,7 @@
           <a:p>
             <a:fld id="{A955D288-C927-46B7-9308-41C8F4860209}" type="datetimeFigureOut">
               <a:rPr lang="en-US" smtClean="0"/>
-              <a:t>4/21/2025</a:t>
+              <a:t>4/22/2025</a:t>
             </a:fld>
             <a:endParaRPr lang="en-US"/>
           </a:p>
@@ -619,7 +626,7 @@
           <a:p>
             <a:fld id="{1FC4FCBB-52D8-4FAC-9E27-B78CD33CF45B}" type="datetime1">
               <a:rPr lang="en-US" smtClean="0"/>
-              <a:t>4/21/2025</a:t>
+              <a:t>4/22/2025</a:t>
             </a:fld>
             <a:endParaRPr lang="en-US"/>
           </a:p>
@@ -817,7 +824,7 @@
           <a:p>
             <a:fld id="{C21F15B8-BE3A-491C-BA12-45A42ACF9921}" type="datetime1">
               <a:rPr lang="en-US" smtClean="0"/>
-              <a:t>4/21/2025</a:t>
+              <a:t>4/22/2025</a:t>
             </a:fld>
             <a:endParaRPr lang="en-US"/>
           </a:p>
@@ -1025,7 +1032,7 @@
           <a:p>
             <a:fld id="{A924A0E7-EB2B-4575-9AED-238A1370FC9A}" type="datetime1">
               <a:rPr lang="en-US" smtClean="0"/>
-              <a:t>4/21/2025</a:t>
+              <a:t>4/22/2025</a:t>
             </a:fld>
             <a:endParaRPr lang="en-US"/>
           </a:p>
@@ -1223,7 +1230,7 @@
           <a:p>
             <a:fld id="{011A56B0-369A-4B1B-8AC9-69BA24BFD810}" type="datetime1">
               <a:rPr lang="en-US" smtClean="0"/>
-              <a:t>4/21/2025</a:t>
+              <a:t>4/22/2025</a:t>
             </a:fld>
             <a:endParaRPr lang="en-US"/>
           </a:p>
@@ -1498,7 +1505,7 @@
           <a:p>
             <a:fld id="{75829453-29C1-4779-84EC-B4B7ED2D38D5}" type="datetime1">
               <a:rPr lang="en-US" smtClean="0"/>
-              <a:t>4/21/2025</a:t>
+              <a:t>4/22/2025</a:t>
             </a:fld>
             <a:endParaRPr lang="en-US"/>
           </a:p>
@@ -1763,7 +1770,7 @@
           <a:p>
             <a:fld id="{2594CB17-E1F8-4D86-9997-C69430279E7F}" type="datetime1">
               <a:rPr lang="en-US" smtClean="0"/>
-              <a:t>4/21/2025</a:t>
+              <a:t>4/22/2025</a:t>
             </a:fld>
             <a:endParaRPr lang="en-US"/>
           </a:p>
@@ -2175,7 +2182,7 @@
           <a:p>
             <a:fld id="{CC309BA0-001F-47EF-93BF-742DDC8E8FC0}" type="datetime1">
               <a:rPr lang="en-US" smtClean="0"/>
-              <a:t>4/21/2025</a:t>
+              <a:t>4/22/2025</a:t>
             </a:fld>
             <a:endParaRPr lang="en-US"/>
           </a:p>
@@ -2316,7 +2323,7 @@
           <a:p>
             <a:fld id="{141B043F-B343-4CA5-B060-9E2B2BC07A78}" type="datetime1">
               <a:rPr lang="en-US" smtClean="0"/>
-              <a:t>4/21/2025</a:t>
+              <a:t>4/22/2025</a:t>
             </a:fld>
             <a:endParaRPr lang="en-US"/>
           </a:p>
@@ -2429,7 +2436,7 @@
           <a:p>
             <a:fld id="{E913A3A9-4579-49DB-8DD1-4278D0207210}" type="datetime1">
               <a:rPr lang="en-US" smtClean="0"/>
-              <a:t>4/21/2025</a:t>
+              <a:t>4/22/2025</a:t>
             </a:fld>
             <a:endParaRPr lang="en-US"/>
           </a:p>
@@ -2740,7 +2747,7 @@
           <a:p>
             <a:fld id="{1516D631-B8A4-4245-9193-6D0C30E0CD0C}" type="datetime1">
               <a:rPr lang="en-US" smtClean="0"/>
-              <a:t>4/21/2025</a:t>
+              <a:t>4/22/2025</a:t>
             </a:fld>
             <a:endParaRPr lang="en-US"/>
           </a:p>
@@ -3028,7 +3035,7 @@
           <a:p>
             <a:fld id="{EFFAC2AA-EE1F-4554-9E21-F38ECC570A7F}" type="datetime1">
               <a:rPr lang="en-US" smtClean="0"/>
-              <a:t>4/21/2025</a:t>
+              <a:t>4/22/2025</a:t>
             </a:fld>
             <a:endParaRPr lang="en-US"/>
           </a:p>
@@ -3279,7 +3286,7 @@
           <a:p>
             <a:fld id="{48225813-D9DC-405D-9A21-745A3C8E8C9E}" type="datetime1">
               <a:rPr lang="en-US" smtClean="0"/>
-              <a:t>4/21/2025</a:t>
+              <a:t>4/22/2025</a:t>
             </a:fld>
             <a:endParaRPr lang="en-US"/>
           </a:p>
@@ -3987,6 +3994,942 @@
     <p:extLst>
       <p:ext uri="{BB962C8B-B14F-4D97-AF65-F5344CB8AC3E}">
         <p14:creationId xmlns:p14="http://schemas.microsoft.com/office/powerpoint/2010/main" val="1567596492"/>
+      </p:ext>
+    </p:extLst>
+  </p:cSld>
+  <p:clrMapOvr>
+    <a:masterClrMapping/>
+  </p:clrMapOvr>
+</p:sld>
+</file>
+
+<file path=ppt/slides/slide10.xml><?xml version="1.0" encoding="utf-8"?>
+<p:sld xmlns:a="http://schemas.openxmlformats.org/drawingml/2006/main" xmlns:r="http://schemas.openxmlformats.org/officeDocument/2006/relationships" xmlns:p="http://schemas.openxmlformats.org/presentationml/2006/main">
+  <p:cSld>
+    <p:spTree>
+      <p:nvGrpSpPr>
+        <p:cNvPr id="1" name=""/>
+        <p:cNvGrpSpPr/>
+        <p:nvPr/>
+      </p:nvGrpSpPr>
+      <p:grpSpPr>
+        <a:xfrm>
+          <a:off x="0" y="0"/>
+          <a:ext cx="0" cy="0"/>
+          <a:chOff x="0" y="0"/>
+          <a:chExt cx="0" cy="0"/>
+        </a:xfrm>
+      </p:grpSpPr>
+      <p:sp>
+        <p:nvSpPr>
+          <p:cNvPr id="2" name="Slide Number Placeholder 1">
+            <a:extLst>
+              <a:ext uri="{FF2B5EF4-FFF2-40B4-BE49-F238E27FC236}">
+                <a16:creationId xmlns:a16="http://schemas.microsoft.com/office/drawing/2014/main" id="{4485B82C-4326-FDAE-7AC8-7FF95D2E685D}"/>
+              </a:ext>
+            </a:extLst>
+          </p:cNvPr>
+          <p:cNvSpPr>
+            <a:spLocks noGrp="1"/>
+          </p:cNvSpPr>
+          <p:nvPr>
+            <p:ph type="sldNum" sz="quarter" idx="12"/>
+          </p:nvPr>
+        </p:nvSpPr>
+        <p:spPr/>
+        <p:txBody>
+          <a:bodyPr/>
+          <a:lstStyle/>
+          <a:p>
+            <a:fld id="{0F70F428-429A-4369-BFBB-0FC7FC84F61D}" type="slidenum">
+              <a:rPr lang="en-US" smtClean="0"/>
+              <a:t>10</a:t>
+            </a:fld>
+            <a:endParaRPr lang="en-US"/>
+          </a:p>
+        </p:txBody>
+      </p:sp>
+      <p:pic>
+        <p:nvPicPr>
+          <p:cNvPr id="4" name="Picture 3">
+            <a:extLst>
+              <a:ext uri="{FF2B5EF4-FFF2-40B4-BE49-F238E27FC236}">
+                <a16:creationId xmlns:a16="http://schemas.microsoft.com/office/drawing/2014/main" id="{DA6682E6-D4AC-C380-DE4C-E59120468B83}"/>
+              </a:ext>
+            </a:extLst>
+          </p:cNvPr>
+          <p:cNvPicPr>
+            <a:picLocks noChangeAspect="1"/>
+          </p:cNvPicPr>
+          <p:nvPr/>
+        </p:nvPicPr>
+        <p:blipFill>
+          <a:blip r:embed="rId2"/>
+          <a:stretch>
+            <a:fillRect/>
+          </a:stretch>
+        </p:blipFill>
+        <p:spPr>
+          <a:xfrm>
+            <a:off x="0" y="1019196"/>
+            <a:ext cx="12192000" cy="5838804"/>
+          </a:xfrm>
+          <a:prstGeom prst="rect">
+            <a:avLst/>
+          </a:prstGeom>
+        </p:spPr>
+      </p:pic>
+      <p:sp>
+        <p:nvSpPr>
+          <p:cNvPr id="6" name="TextBox 5">
+            <a:extLst>
+              <a:ext uri="{FF2B5EF4-FFF2-40B4-BE49-F238E27FC236}">
+                <a16:creationId xmlns:a16="http://schemas.microsoft.com/office/drawing/2014/main" id="{8C21C444-0103-1DE0-1AC3-AB5A5669D33F}"/>
+              </a:ext>
+            </a:extLst>
+          </p:cNvPr>
+          <p:cNvSpPr txBox="1"/>
+          <p:nvPr/>
+        </p:nvSpPr>
+        <p:spPr>
+          <a:xfrm>
+            <a:off x="235974" y="339213"/>
+            <a:ext cx="5501149" cy="584775"/>
+          </a:xfrm>
+          <a:prstGeom prst="rect">
+            <a:avLst/>
+          </a:prstGeom>
+          <a:noFill/>
+        </p:spPr>
+        <p:txBody>
+          <a:bodyPr wrap="square" rtlCol="0">
+            <a:spAutoFit/>
+          </a:bodyPr>
+          <a:lstStyle/>
+          <a:p>
+            <a:pPr marL="457200" indent="-457200">
+              <a:buFont typeface="Wingdings" panose="05000000000000000000" pitchFamily="2" charset="2"/>
+              <a:buChar char="v"/>
+            </a:pPr>
+            <a:r>
+              <a:rPr lang="en-US" sz="3200" b="1" dirty="0">
+                <a:solidFill>
+                  <a:schemeClr val="accent1"/>
+                </a:solidFill>
+              </a:rPr>
+              <a:t>Home Page</a:t>
+            </a:r>
+          </a:p>
+        </p:txBody>
+      </p:sp>
+    </p:spTree>
+    <p:extLst>
+      <p:ext uri="{BB962C8B-B14F-4D97-AF65-F5344CB8AC3E}">
+        <p14:creationId xmlns:p14="http://schemas.microsoft.com/office/powerpoint/2010/main" val="2989396247"/>
+      </p:ext>
+    </p:extLst>
+  </p:cSld>
+  <p:clrMapOvr>
+    <a:masterClrMapping/>
+  </p:clrMapOvr>
+</p:sld>
+</file>
+
+<file path=ppt/slides/slide11.xml><?xml version="1.0" encoding="utf-8"?>
+<p:sld xmlns:a="http://schemas.openxmlformats.org/drawingml/2006/main" xmlns:r="http://schemas.openxmlformats.org/officeDocument/2006/relationships" xmlns:p="http://schemas.openxmlformats.org/presentationml/2006/main">
+  <p:cSld>
+    <p:spTree>
+      <p:nvGrpSpPr>
+        <p:cNvPr id="1" name="">
+          <a:extLst>
+            <a:ext uri="{FF2B5EF4-FFF2-40B4-BE49-F238E27FC236}">
+              <a16:creationId xmlns:a16="http://schemas.microsoft.com/office/drawing/2014/main" id="{CFC7FC12-447E-1B02-0288-653F0AA68CAC}"/>
+            </a:ext>
+          </a:extLst>
+        </p:cNvPr>
+        <p:cNvGrpSpPr/>
+        <p:nvPr/>
+      </p:nvGrpSpPr>
+      <p:grpSpPr>
+        <a:xfrm>
+          <a:off x="0" y="0"/>
+          <a:ext cx="0" cy="0"/>
+          <a:chOff x="0" y="0"/>
+          <a:chExt cx="0" cy="0"/>
+        </a:xfrm>
+      </p:grpSpPr>
+      <p:sp>
+        <p:nvSpPr>
+          <p:cNvPr id="2" name="Slide Number Placeholder 1">
+            <a:extLst>
+              <a:ext uri="{FF2B5EF4-FFF2-40B4-BE49-F238E27FC236}">
+                <a16:creationId xmlns:a16="http://schemas.microsoft.com/office/drawing/2014/main" id="{0FADE551-92BF-4378-E67F-03094FF88D0A}"/>
+              </a:ext>
+            </a:extLst>
+          </p:cNvPr>
+          <p:cNvSpPr>
+            <a:spLocks noGrp="1"/>
+          </p:cNvSpPr>
+          <p:nvPr>
+            <p:ph type="sldNum" sz="quarter" idx="12"/>
+          </p:nvPr>
+        </p:nvSpPr>
+        <p:spPr/>
+        <p:txBody>
+          <a:bodyPr/>
+          <a:lstStyle/>
+          <a:p>
+            <a:fld id="{0F70F428-429A-4369-BFBB-0FC7FC84F61D}" type="slidenum">
+              <a:rPr lang="en-US" smtClean="0"/>
+              <a:t>11</a:t>
+            </a:fld>
+            <a:endParaRPr lang="en-US"/>
+          </a:p>
+        </p:txBody>
+      </p:sp>
+      <p:sp>
+        <p:nvSpPr>
+          <p:cNvPr id="6" name="TextBox 5">
+            <a:extLst>
+              <a:ext uri="{FF2B5EF4-FFF2-40B4-BE49-F238E27FC236}">
+                <a16:creationId xmlns:a16="http://schemas.microsoft.com/office/drawing/2014/main" id="{7E139CB7-5512-CEA9-C7EB-004BBB1EDE01}"/>
+              </a:ext>
+            </a:extLst>
+          </p:cNvPr>
+          <p:cNvSpPr txBox="1"/>
+          <p:nvPr/>
+        </p:nvSpPr>
+        <p:spPr>
+          <a:xfrm>
+            <a:off x="235974" y="339213"/>
+            <a:ext cx="5501149" cy="584775"/>
+          </a:xfrm>
+          <a:prstGeom prst="rect">
+            <a:avLst/>
+          </a:prstGeom>
+          <a:noFill/>
+        </p:spPr>
+        <p:txBody>
+          <a:bodyPr wrap="square" rtlCol="0">
+            <a:spAutoFit/>
+          </a:bodyPr>
+          <a:lstStyle/>
+          <a:p>
+            <a:pPr marL="457200" indent="-457200">
+              <a:buFont typeface="Wingdings" panose="05000000000000000000" pitchFamily="2" charset="2"/>
+              <a:buChar char="v"/>
+            </a:pPr>
+            <a:r>
+              <a:rPr lang="en-US" sz="3200" b="1" dirty="0">
+                <a:solidFill>
+                  <a:schemeClr val="accent1"/>
+                </a:solidFill>
+              </a:rPr>
+              <a:t>Journal Page</a:t>
+            </a:r>
+          </a:p>
+        </p:txBody>
+      </p:sp>
+      <p:pic>
+        <p:nvPicPr>
+          <p:cNvPr id="8" name="Picture 7">
+            <a:extLst>
+              <a:ext uri="{FF2B5EF4-FFF2-40B4-BE49-F238E27FC236}">
+                <a16:creationId xmlns:a16="http://schemas.microsoft.com/office/drawing/2014/main" id="{119D59F1-CBF2-A725-D04A-E3D8FB06069A}"/>
+              </a:ext>
+            </a:extLst>
+          </p:cNvPr>
+          <p:cNvPicPr>
+            <a:picLocks noChangeAspect="1"/>
+          </p:cNvPicPr>
+          <p:nvPr/>
+        </p:nvPicPr>
+        <p:blipFill>
+          <a:blip r:embed="rId2"/>
+          <a:stretch>
+            <a:fillRect/>
+          </a:stretch>
+        </p:blipFill>
+        <p:spPr>
+          <a:xfrm>
+            <a:off x="0" y="1019196"/>
+            <a:ext cx="12192000" cy="5838804"/>
+          </a:xfrm>
+          <a:prstGeom prst="rect">
+            <a:avLst/>
+          </a:prstGeom>
+        </p:spPr>
+      </p:pic>
+    </p:spTree>
+    <p:extLst>
+      <p:ext uri="{BB962C8B-B14F-4D97-AF65-F5344CB8AC3E}">
+        <p14:creationId xmlns:p14="http://schemas.microsoft.com/office/powerpoint/2010/main" val="3325281987"/>
+      </p:ext>
+    </p:extLst>
+  </p:cSld>
+  <p:clrMapOvr>
+    <a:masterClrMapping/>
+  </p:clrMapOvr>
+</p:sld>
+</file>
+
+<file path=ppt/slides/slide12.xml><?xml version="1.0" encoding="utf-8"?>
+<p:sld xmlns:a="http://schemas.openxmlformats.org/drawingml/2006/main" xmlns:r="http://schemas.openxmlformats.org/officeDocument/2006/relationships" xmlns:p="http://schemas.openxmlformats.org/presentationml/2006/main">
+  <p:cSld>
+    <p:spTree>
+      <p:nvGrpSpPr>
+        <p:cNvPr id="1" name="">
+          <a:extLst>
+            <a:ext uri="{FF2B5EF4-FFF2-40B4-BE49-F238E27FC236}">
+              <a16:creationId xmlns:a16="http://schemas.microsoft.com/office/drawing/2014/main" id="{1E7135CD-A61B-9E12-AE7E-0AA333737271}"/>
+            </a:ext>
+          </a:extLst>
+        </p:cNvPr>
+        <p:cNvGrpSpPr/>
+        <p:nvPr/>
+      </p:nvGrpSpPr>
+      <p:grpSpPr>
+        <a:xfrm>
+          <a:off x="0" y="0"/>
+          <a:ext cx="0" cy="0"/>
+          <a:chOff x="0" y="0"/>
+          <a:chExt cx="0" cy="0"/>
+        </a:xfrm>
+      </p:grpSpPr>
+      <p:sp>
+        <p:nvSpPr>
+          <p:cNvPr id="2" name="Slide Number Placeholder 1">
+            <a:extLst>
+              <a:ext uri="{FF2B5EF4-FFF2-40B4-BE49-F238E27FC236}">
+                <a16:creationId xmlns:a16="http://schemas.microsoft.com/office/drawing/2014/main" id="{E9E7AED1-29F6-FD51-33D2-74D2B65C066A}"/>
+              </a:ext>
+            </a:extLst>
+          </p:cNvPr>
+          <p:cNvSpPr>
+            <a:spLocks noGrp="1"/>
+          </p:cNvSpPr>
+          <p:nvPr>
+            <p:ph type="sldNum" sz="quarter" idx="12"/>
+          </p:nvPr>
+        </p:nvSpPr>
+        <p:spPr/>
+        <p:txBody>
+          <a:bodyPr/>
+          <a:lstStyle/>
+          <a:p>
+            <a:fld id="{0F70F428-429A-4369-BFBB-0FC7FC84F61D}" type="slidenum">
+              <a:rPr lang="en-US" smtClean="0"/>
+              <a:t>12</a:t>
+            </a:fld>
+            <a:endParaRPr lang="en-US"/>
+          </a:p>
+        </p:txBody>
+      </p:sp>
+      <p:sp>
+        <p:nvSpPr>
+          <p:cNvPr id="6" name="TextBox 5">
+            <a:extLst>
+              <a:ext uri="{FF2B5EF4-FFF2-40B4-BE49-F238E27FC236}">
+                <a16:creationId xmlns:a16="http://schemas.microsoft.com/office/drawing/2014/main" id="{553F111F-6492-DEC5-C4E6-20EA791A6B7C}"/>
+              </a:ext>
+            </a:extLst>
+          </p:cNvPr>
+          <p:cNvSpPr txBox="1"/>
+          <p:nvPr/>
+        </p:nvSpPr>
+        <p:spPr>
+          <a:xfrm>
+            <a:off x="235974" y="339213"/>
+            <a:ext cx="5501149" cy="584775"/>
+          </a:xfrm>
+          <a:prstGeom prst="rect">
+            <a:avLst/>
+          </a:prstGeom>
+          <a:noFill/>
+        </p:spPr>
+        <p:txBody>
+          <a:bodyPr wrap="square" rtlCol="0">
+            <a:spAutoFit/>
+          </a:bodyPr>
+          <a:lstStyle/>
+          <a:p>
+            <a:pPr marL="457200" indent="-457200">
+              <a:buFont typeface="Wingdings" panose="05000000000000000000" pitchFamily="2" charset="2"/>
+              <a:buChar char="v"/>
+            </a:pPr>
+            <a:r>
+              <a:rPr lang="en-US" sz="3200" b="1" dirty="0">
+                <a:solidFill>
+                  <a:schemeClr val="accent1"/>
+                </a:solidFill>
+              </a:rPr>
+              <a:t>Service Page</a:t>
+            </a:r>
+          </a:p>
+        </p:txBody>
+      </p:sp>
+      <p:pic>
+        <p:nvPicPr>
+          <p:cNvPr id="4" name="Picture 3">
+            <a:extLst>
+              <a:ext uri="{FF2B5EF4-FFF2-40B4-BE49-F238E27FC236}">
+                <a16:creationId xmlns:a16="http://schemas.microsoft.com/office/drawing/2014/main" id="{B94668A5-2B57-3CD2-F563-F8999B674E0B}"/>
+              </a:ext>
+            </a:extLst>
+          </p:cNvPr>
+          <p:cNvPicPr>
+            <a:picLocks noChangeAspect="1"/>
+          </p:cNvPicPr>
+          <p:nvPr/>
+        </p:nvPicPr>
+        <p:blipFill>
+          <a:blip r:embed="rId2"/>
+          <a:stretch>
+            <a:fillRect/>
+          </a:stretch>
+        </p:blipFill>
+        <p:spPr>
+          <a:xfrm>
+            <a:off x="0" y="1019196"/>
+            <a:ext cx="12192000" cy="5838804"/>
+          </a:xfrm>
+          <a:prstGeom prst="rect">
+            <a:avLst/>
+          </a:prstGeom>
+        </p:spPr>
+      </p:pic>
+    </p:spTree>
+    <p:extLst>
+      <p:ext uri="{BB962C8B-B14F-4D97-AF65-F5344CB8AC3E}">
+        <p14:creationId xmlns:p14="http://schemas.microsoft.com/office/powerpoint/2010/main" val="2401909461"/>
+      </p:ext>
+    </p:extLst>
+  </p:cSld>
+  <p:clrMapOvr>
+    <a:masterClrMapping/>
+  </p:clrMapOvr>
+</p:sld>
+</file>
+
+<file path=ppt/slides/slide13.xml><?xml version="1.0" encoding="utf-8"?>
+<p:sld xmlns:a="http://schemas.openxmlformats.org/drawingml/2006/main" xmlns:r="http://schemas.openxmlformats.org/officeDocument/2006/relationships" xmlns:p="http://schemas.openxmlformats.org/presentationml/2006/main">
+  <p:cSld>
+    <p:spTree>
+      <p:nvGrpSpPr>
+        <p:cNvPr id="1" name="">
+          <a:extLst>
+            <a:ext uri="{FF2B5EF4-FFF2-40B4-BE49-F238E27FC236}">
+              <a16:creationId xmlns:a16="http://schemas.microsoft.com/office/drawing/2014/main" id="{B2C19A80-DB22-14AE-0358-27B109E162D8}"/>
+            </a:ext>
+          </a:extLst>
+        </p:cNvPr>
+        <p:cNvGrpSpPr/>
+        <p:nvPr/>
+      </p:nvGrpSpPr>
+      <p:grpSpPr>
+        <a:xfrm>
+          <a:off x="0" y="0"/>
+          <a:ext cx="0" cy="0"/>
+          <a:chOff x="0" y="0"/>
+          <a:chExt cx="0" cy="0"/>
+        </a:xfrm>
+      </p:grpSpPr>
+      <p:sp>
+        <p:nvSpPr>
+          <p:cNvPr id="2" name="Slide Number Placeholder 1">
+            <a:extLst>
+              <a:ext uri="{FF2B5EF4-FFF2-40B4-BE49-F238E27FC236}">
+                <a16:creationId xmlns:a16="http://schemas.microsoft.com/office/drawing/2014/main" id="{0985C8D2-510B-C19F-49D9-40C6A9DB103C}"/>
+              </a:ext>
+            </a:extLst>
+          </p:cNvPr>
+          <p:cNvSpPr>
+            <a:spLocks noGrp="1"/>
+          </p:cNvSpPr>
+          <p:nvPr>
+            <p:ph type="sldNum" sz="quarter" idx="12"/>
+          </p:nvPr>
+        </p:nvSpPr>
+        <p:spPr/>
+        <p:txBody>
+          <a:bodyPr/>
+          <a:lstStyle/>
+          <a:p>
+            <a:fld id="{0F70F428-429A-4369-BFBB-0FC7FC84F61D}" type="slidenum">
+              <a:rPr lang="en-US" smtClean="0"/>
+              <a:t>13</a:t>
+            </a:fld>
+            <a:endParaRPr lang="en-US"/>
+          </a:p>
+        </p:txBody>
+      </p:sp>
+      <p:sp>
+        <p:nvSpPr>
+          <p:cNvPr id="6" name="TextBox 5">
+            <a:extLst>
+              <a:ext uri="{FF2B5EF4-FFF2-40B4-BE49-F238E27FC236}">
+                <a16:creationId xmlns:a16="http://schemas.microsoft.com/office/drawing/2014/main" id="{D2708B69-27BD-4E80-364E-03C1B64CA25A}"/>
+              </a:ext>
+            </a:extLst>
+          </p:cNvPr>
+          <p:cNvSpPr txBox="1"/>
+          <p:nvPr/>
+        </p:nvSpPr>
+        <p:spPr>
+          <a:xfrm>
+            <a:off x="235974" y="339213"/>
+            <a:ext cx="5501149" cy="584775"/>
+          </a:xfrm>
+          <a:prstGeom prst="rect">
+            <a:avLst/>
+          </a:prstGeom>
+          <a:noFill/>
+        </p:spPr>
+        <p:txBody>
+          <a:bodyPr wrap="square" rtlCol="0">
+            <a:spAutoFit/>
+          </a:bodyPr>
+          <a:lstStyle/>
+          <a:p>
+            <a:pPr marL="457200" indent="-457200">
+              <a:buFont typeface="Wingdings" panose="05000000000000000000" pitchFamily="2" charset="2"/>
+              <a:buChar char="v"/>
+            </a:pPr>
+            <a:r>
+              <a:rPr lang="en-US" sz="3200" b="1" dirty="0">
+                <a:solidFill>
+                  <a:schemeClr val="accent1"/>
+                </a:solidFill>
+              </a:rPr>
+              <a:t>Contact Page</a:t>
+            </a:r>
+          </a:p>
+        </p:txBody>
+      </p:sp>
+      <p:pic>
+        <p:nvPicPr>
+          <p:cNvPr id="5" name="Picture 4">
+            <a:extLst>
+              <a:ext uri="{FF2B5EF4-FFF2-40B4-BE49-F238E27FC236}">
+                <a16:creationId xmlns:a16="http://schemas.microsoft.com/office/drawing/2014/main" id="{3439802B-CEE6-5919-9E97-832290D41F7B}"/>
+              </a:ext>
+            </a:extLst>
+          </p:cNvPr>
+          <p:cNvPicPr>
+            <a:picLocks noChangeAspect="1"/>
+          </p:cNvPicPr>
+          <p:nvPr/>
+        </p:nvPicPr>
+        <p:blipFill>
+          <a:blip r:embed="rId2"/>
+          <a:stretch>
+            <a:fillRect/>
+          </a:stretch>
+        </p:blipFill>
+        <p:spPr>
+          <a:xfrm>
+            <a:off x="0" y="1019196"/>
+            <a:ext cx="12192000" cy="5838804"/>
+          </a:xfrm>
+          <a:prstGeom prst="rect">
+            <a:avLst/>
+          </a:prstGeom>
+        </p:spPr>
+      </p:pic>
+    </p:spTree>
+    <p:extLst>
+      <p:ext uri="{BB962C8B-B14F-4D97-AF65-F5344CB8AC3E}">
+        <p14:creationId xmlns:p14="http://schemas.microsoft.com/office/powerpoint/2010/main" val="1191315647"/>
+      </p:ext>
+    </p:extLst>
+  </p:cSld>
+  <p:clrMapOvr>
+    <a:masterClrMapping/>
+  </p:clrMapOvr>
+</p:sld>
+</file>
+
+<file path=ppt/slides/slide14.xml><?xml version="1.0" encoding="utf-8"?>
+<p:sld xmlns:a="http://schemas.openxmlformats.org/drawingml/2006/main" xmlns:r="http://schemas.openxmlformats.org/officeDocument/2006/relationships" xmlns:p="http://schemas.openxmlformats.org/presentationml/2006/main">
+  <p:cSld>
+    <p:spTree>
+      <p:nvGrpSpPr>
+        <p:cNvPr id="1" name="">
+          <a:extLst>
+            <a:ext uri="{FF2B5EF4-FFF2-40B4-BE49-F238E27FC236}">
+              <a16:creationId xmlns:a16="http://schemas.microsoft.com/office/drawing/2014/main" id="{4900BDC6-3D49-DF5D-B265-C7D91583957A}"/>
+            </a:ext>
+          </a:extLst>
+        </p:cNvPr>
+        <p:cNvGrpSpPr/>
+        <p:nvPr/>
+      </p:nvGrpSpPr>
+      <p:grpSpPr>
+        <a:xfrm>
+          <a:off x="0" y="0"/>
+          <a:ext cx="0" cy="0"/>
+          <a:chOff x="0" y="0"/>
+          <a:chExt cx="0" cy="0"/>
+        </a:xfrm>
+      </p:grpSpPr>
+      <p:sp>
+        <p:nvSpPr>
+          <p:cNvPr id="2" name="Slide Number Placeholder 1">
+            <a:extLst>
+              <a:ext uri="{FF2B5EF4-FFF2-40B4-BE49-F238E27FC236}">
+                <a16:creationId xmlns:a16="http://schemas.microsoft.com/office/drawing/2014/main" id="{FF4BEB68-75BF-60B7-8074-1740F5DADB4E}"/>
+              </a:ext>
+            </a:extLst>
+          </p:cNvPr>
+          <p:cNvSpPr>
+            <a:spLocks noGrp="1"/>
+          </p:cNvSpPr>
+          <p:nvPr>
+            <p:ph type="sldNum" sz="quarter" idx="12"/>
+          </p:nvPr>
+        </p:nvSpPr>
+        <p:spPr/>
+        <p:txBody>
+          <a:bodyPr/>
+          <a:lstStyle/>
+          <a:p>
+            <a:fld id="{0F70F428-429A-4369-BFBB-0FC7FC84F61D}" type="slidenum">
+              <a:rPr lang="en-US" smtClean="0"/>
+              <a:t>14</a:t>
+            </a:fld>
+            <a:endParaRPr lang="en-US"/>
+          </a:p>
+        </p:txBody>
+      </p:sp>
+      <p:sp>
+        <p:nvSpPr>
+          <p:cNvPr id="6" name="TextBox 5">
+            <a:extLst>
+              <a:ext uri="{FF2B5EF4-FFF2-40B4-BE49-F238E27FC236}">
+                <a16:creationId xmlns:a16="http://schemas.microsoft.com/office/drawing/2014/main" id="{F95400E3-3F32-487F-833E-6D6E7D169FDA}"/>
+              </a:ext>
+            </a:extLst>
+          </p:cNvPr>
+          <p:cNvSpPr txBox="1"/>
+          <p:nvPr/>
+        </p:nvSpPr>
+        <p:spPr>
+          <a:xfrm>
+            <a:off x="235974" y="339213"/>
+            <a:ext cx="5501149" cy="584775"/>
+          </a:xfrm>
+          <a:prstGeom prst="rect">
+            <a:avLst/>
+          </a:prstGeom>
+          <a:noFill/>
+        </p:spPr>
+        <p:txBody>
+          <a:bodyPr wrap="square" rtlCol="0">
+            <a:spAutoFit/>
+          </a:bodyPr>
+          <a:lstStyle/>
+          <a:p>
+            <a:pPr marL="457200" indent="-457200">
+              <a:buFont typeface="Wingdings" panose="05000000000000000000" pitchFamily="2" charset="2"/>
+              <a:buChar char="v"/>
+            </a:pPr>
+            <a:r>
+              <a:rPr lang="en-US" sz="3200" b="1" dirty="0">
+                <a:solidFill>
+                  <a:schemeClr val="accent1"/>
+                </a:solidFill>
+              </a:rPr>
+              <a:t>Login Page</a:t>
+            </a:r>
+          </a:p>
+        </p:txBody>
+      </p:sp>
+      <p:pic>
+        <p:nvPicPr>
+          <p:cNvPr id="4" name="Picture 3">
+            <a:extLst>
+              <a:ext uri="{FF2B5EF4-FFF2-40B4-BE49-F238E27FC236}">
+                <a16:creationId xmlns:a16="http://schemas.microsoft.com/office/drawing/2014/main" id="{45F7A5C7-9C41-F1E5-FEFF-51716F871B9F}"/>
+              </a:ext>
+            </a:extLst>
+          </p:cNvPr>
+          <p:cNvPicPr>
+            <a:picLocks noChangeAspect="1"/>
+          </p:cNvPicPr>
+          <p:nvPr/>
+        </p:nvPicPr>
+        <p:blipFill>
+          <a:blip r:embed="rId2"/>
+          <a:stretch>
+            <a:fillRect/>
+          </a:stretch>
+        </p:blipFill>
+        <p:spPr>
+          <a:xfrm>
+            <a:off x="0" y="1019196"/>
+            <a:ext cx="12192000" cy="5838804"/>
+          </a:xfrm>
+          <a:prstGeom prst="rect">
+            <a:avLst/>
+          </a:prstGeom>
+        </p:spPr>
+      </p:pic>
+    </p:spTree>
+    <p:extLst>
+      <p:ext uri="{BB962C8B-B14F-4D97-AF65-F5344CB8AC3E}">
+        <p14:creationId xmlns:p14="http://schemas.microsoft.com/office/powerpoint/2010/main" val="3498208302"/>
+      </p:ext>
+    </p:extLst>
+  </p:cSld>
+  <p:clrMapOvr>
+    <a:masterClrMapping/>
+  </p:clrMapOvr>
+</p:sld>
+</file>
+
+<file path=ppt/slides/slide15.xml><?xml version="1.0" encoding="utf-8"?>
+<p:sld xmlns:a="http://schemas.openxmlformats.org/drawingml/2006/main" xmlns:r="http://schemas.openxmlformats.org/officeDocument/2006/relationships" xmlns:p="http://schemas.openxmlformats.org/presentationml/2006/main">
+  <p:cSld>
+    <p:spTree>
+      <p:nvGrpSpPr>
+        <p:cNvPr id="1" name="">
+          <a:extLst>
+            <a:ext uri="{FF2B5EF4-FFF2-40B4-BE49-F238E27FC236}">
+              <a16:creationId xmlns:a16="http://schemas.microsoft.com/office/drawing/2014/main" id="{5309A5EB-371F-E8CA-101D-87FB2D0A255D}"/>
+            </a:ext>
+          </a:extLst>
+        </p:cNvPr>
+        <p:cNvGrpSpPr/>
+        <p:nvPr/>
+      </p:nvGrpSpPr>
+      <p:grpSpPr>
+        <a:xfrm>
+          <a:off x="0" y="0"/>
+          <a:ext cx="0" cy="0"/>
+          <a:chOff x="0" y="0"/>
+          <a:chExt cx="0" cy="0"/>
+        </a:xfrm>
+      </p:grpSpPr>
+      <p:sp>
+        <p:nvSpPr>
+          <p:cNvPr id="2" name="Slide Number Placeholder 1">
+            <a:extLst>
+              <a:ext uri="{FF2B5EF4-FFF2-40B4-BE49-F238E27FC236}">
+                <a16:creationId xmlns:a16="http://schemas.microsoft.com/office/drawing/2014/main" id="{DA35269B-9C33-F439-4514-47AAB1CA3F9A}"/>
+              </a:ext>
+            </a:extLst>
+          </p:cNvPr>
+          <p:cNvSpPr>
+            <a:spLocks noGrp="1"/>
+          </p:cNvSpPr>
+          <p:nvPr>
+            <p:ph type="sldNum" sz="quarter" idx="12"/>
+          </p:nvPr>
+        </p:nvSpPr>
+        <p:spPr/>
+        <p:txBody>
+          <a:bodyPr/>
+          <a:lstStyle/>
+          <a:p>
+            <a:fld id="{0F70F428-429A-4369-BFBB-0FC7FC84F61D}" type="slidenum">
+              <a:rPr lang="en-US" smtClean="0"/>
+              <a:t>15</a:t>
+            </a:fld>
+            <a:endParaRPr lang="en-US"/>
+          </a:p>
+        </p:txBody>
+      </p:sp>
+      <p:sp>
+        <p:nvSpPr>
+          <p:cNvPr id="6" name="TextBox 5">
+            <a:extLst>
+              <a:ext uri="{FF2B5EF4-FFF2-40B4-BE49-F238E27FC236}">
+                <a16:creationId xmlns:a16="http://schemas.microsoft.com/office/drawing/2014/main" id="{642359B8-727A-9DAE-84D3-C3B8A4746C65}"/>
+              </a:ext>
+            </a:extLst>
+          </p:cNvPr>
+          <p:cNvSpPr txBox="1"/>
+          <p:nvPr/>
+        </p:nvSpPr>
+        <p:spPr>
+          <a:xfrm>
+            <a:off x="235974" y="339213"/>
+            <a:ext cx="5501149" cy="584775"/>
+          </a:xfrm>
+          <a:prstGeom prst="rect">
+            <a:avLst/>
+          </a:prstGeom>
+          <a:noFill/>
+        </p:spPr>
+        <p:txBody>
+          <a:bodyPr wrap="square" rtlCol="0">
+            <a:spAutoFit/>
+          </a:bodyPr>
+          <a:lstStyle/>
+          <a:p>
+            <a:pPr marL="457200" indent="-457200">
+              <a:buFont typeface="Wingdings" panose="05000000000000000000" pitchFamily="2" charset="2"/>
+              <a:buChar char="v"/>
+            </a:pPr>
+            <a:r>
+              <a:rPr lang="en-US" sz="3200" b="1" dirty="0">
+                <a:solidFill>
+                  <a:schemeClr val="accent1"/>
+                </a:solidFill>
+              </a:rPr>
+              <a:t>Registration Page</a:t>
+            </a:r>
+          </a:p>
+        </p:txBody>
+      </p:sp>
+      <p:pic>
+        <p:nvPicPr>
+          <p:cNvPr id="5" name="Picture 4">
+            <a:extLst>
+              <a:ext uri="{FF2B5EF4-FFF2-40B4-BE49-F238E27FC236}">
+                <a16:creationId xmlns:a16="http://schemas.microsoft.com/office/drawing/2014/main" id="{4F943D16-D090-0511-0324-CA968FCD089C}"/>
+              </a:ext>
+            </a:extLst>
+          </p:cNvPr>
+          <p:cNvPicPr>
+            <a:picLocks noChangeAspect="1"/>
+          </p:cNvPicPr>
+          <p:nvPr/>
+        </p:nvPicPr>
+        <p:blipFill>
+          <a:blip r:embed="rId2"/>
+          <a:stretch>
+            <a:fillRect/>
+          </a:stretch>
+        </p:blipFill>
+        <p:spPr>
+          <a:xfrm>
+            <a:off x="0" y="1019196"/>
+            <a:ext cx="12192000" cy="5838804"/>
+          </a:xfrm>
+          <a:prstGeom prst="rect">
+            <a:avLst/>
+          </a:prstGeom>
+        </p:spPr>
+      </p:pic>
+    </p:spTree>
+    <p:extLst>
+      <p:ext uri="{BB962C8B-B14F-4D97-AF65-F5344CB8AC3E}">
+        <p14:creationId xmlns:p14="http://schemas.microsoft.com/office/powerpoint/2010/main" val="2974975366"/>
+      </p:ext>
+    </p:extLst>
+  </p:cSld>
+  <p:clrMapOvr>
+    <a:masterClrMapping/>
+  </p:clrMapOvr>
+</p:sld>
+</file>
+
+<file path=ppt/slides/slide16.xml><?xml version="1.0" encoding="utf-8"?>
+<p:sld xmlns:a="http://schemas.openxmlformats.org/drawingml/2006/main" xmlns:r="http://schemas.openxmlformats.org/officeDocument/2006/relationships" xmlns:p="http://schemas.openxmlformats.org/presentationml/2006/main">
+  <p:cSld>
+    <p:spTree>
+      <p:nvGrpSpPr>
+        <p:cNvPr id="1" name=""/>
+        <p:cNvGrpSpPr/>
+        <p:nvPr/>
+      </p:nvGrpSpPr>
+      <p:grpSpPr>
+        <a:xfrm>
+          <a:off x="0" y="0"/>
+          <a:ext cx="0" cy="0"/>
+          <a:chOff x="0" y="0"/>
+          <a:chExt cx="0" cy="0"/>
+        </a:xfrm>
+      </p:grpSpPr>
+      <p:sp>
+        <p:nvSpPr>
+          <p:cNvPr id="2" name="Slide Number Placeholder 1">
+            <a:extLst>
+              <a:ext uri="{FF2B5EF4-FFF2-40B4-BE49-F238E27FC236}">
+                <a16:creationId xmlns:a16="http://schemas.microsoft.com/office/drawing/2014/main" id="{813BB3FD-8632-A108-A4FF-A6219AC8C08C}"/>
+              </a:ext>
+            </a:extLst>
+          </p:cNvPr>
+          <p:cNvSpPr>
+            <a:spLocks noGrp="1"/>
+          </p:cNvSpPr>
+          <p:nvPr>
+            <p:ph type="sldNum" sz="quarter" idx="12"/>
+          </p:nvPr>
+        </p:nvSpPr>
+        <p:spPr/>
+        <p:txBody>
+          <a:bodyPr/>
+          <a:lstStyle/>
+          <a:p>
+            <a:fld id="{0F70F428-429A-4369-BFBB-0FC7FC84F61D}" type="slidenum">
+              <a:rPr lang="en-US" smtClean="0"/>
+              <a:t>16</a:t>
+            </a:fld>
+            <a:endParaRPr lang="en-US"/>
+          </a:p>
+        </p:txBody>
+      </p:sp>
+      <p:sp>
+        <p:nvSpPr>
+          <p:cNvPr id="3" name="TextBox 2">
+            <a:extLst>
+              <a:ext uri="{FF2B5EF4-FFF2-40B4-BE49-F238E27FC236}">
+                <a16:creationId xmlns:a16="http://schemas.microsoft.com/office/drawing/2014/main" id="{A42A3CD8-C158-6005-3B0A-56A63D64F650}"/>
+              </a:ext>
+            </a:extLst>
+          </p:cNvPr>
+          <p:cNvSpPr txBox="1"/>
+          <p:nvPr/>
+        </p:nvSpPr>
+        <p:spPr>
+          <a:xfrm>
+            <a:off x="3043084" y="2241756"/>
+            <a:ext cx="6105832" cy="923330"/>
+          </a:xfrm>
+          <a:prstGeom prst="rect">
+            <a:avLst/>
+          </a:prstGeom>
+          <a:noFill/>
+        </p:spPr>
+        <p:txBody>
+          <a:bodyPr wrap="square" rtlCol="0">
+            <a:spAutoFit/>
+          </a:bodyPr>
+          <a:lstStyle/>
+          <a:p>
+            <a:pPr algn="ctr"/>
+            <a:r>
+              <a:rPr lang="en-US" sz="5400" b="1" dirty="0">
+                <a:solidFill>
+                  <a:schemeClr val="tx2"/>
+                </a:solidFill>
+              </a:rPr>
+              <a:t>Thank You! </a:t>
+            </a:r>
+            <a:r>
+              <a:rPr lang="en-US" sz="5400" b="1" i="0" dirty="0">
+                <a:solidFill>
+                  <a:schemeClr val="tx2"/>
+                </a:solidFill>
+                <a:effectLst/>
+                <a:latin typeface="RundDisplaySemiBold"/>
+              </a:rPr>
+              <a:t> </a:t>
+            </a:r>
+            <a:endParaRPr lang="en-US" sz="5400" b="1" dirty="0">
+              <a:solidFill>
+                <a:schemeClr val="tx2"/>
+              </a:solidFill>
+            </a:endParaRPr>
+          </a:p>
+        </p:txBody>
+      </p:sp>
+    </p:spTree>
+    <p:extLst>
+      <p:ext uri="{BB962C8B-B14F-4D97-AF65-F5344CB8AC3E}">
+        <p14:creationId xmlns:p14="http://schemas.microsoft.com/office/powerpoint/2010/main" val="3876965419"/>
       </p:ext>
     </p:extLst>
   </p:cSld>

</xml_diff>